<commit_message>
Stuff moved to appendix
</commit_message>
<xml_diff>
--- a/figures/NN_maxload.pptx
+++ b/figures/NN_maxload.pptx
@@ -2,18 +2,18 @@
 <file path=ppt/presentation.xml><?xml version="1.0" encoding="utf-8"?>
 <p:presentation xmlns:a="http://schemas.openxmlformats.org/drawingml/2006/main" xmlns:r="http://schemas.openxmlformats.org/officeDocument/2006/relationships" xmlns:p="http://schemas.openxmlformats.org/presentationml/2006/main" saveSubsetFonts="1">
   <p:sldMasterIdLst>
-    <p:sldMasterId id="2147483648" r:id="rId1"/>
+    <p:sldMasterId id="2147483708" r:id="rId1"/>
   </p:sldMasterIdLst>
   <p:sldIdLst>
     <p:sldId id="256" r:id="rId2"/>
   </p:sldIdLst>
-  <p:sldSz cx="12192000" cy="6858000"/>
+  <p:sldSz cx="10439400" cy="1800225"/>
   <p:notesSz cx="6858000" cy="9144000"/>
   <p:defaultTextStyle>
     <a:defPPr>
       <a:defRPr lang="en-US"/>
     </a:defPPr>
-    <a:lvl1pPr marL="0" algn="l" defTabSz="914400" rtl="0" eaLnBrk="1" latinLnBrk="0" hangingPunct="1">
+    <a:lvl1pPr marL="0" algn="l" defTabSz="457200" rtl="0" eaLnBrk="1" latinLnBrk="0" hangingPunct="1">
       <a:defRPr sz="1800" kern="1200">
         <a:solidFill>
           <a:schemeClr val="tx1"/>
@@ -23,7 +23,7 @@
         <a:cs typeface="+mn-cs"/>
       </a:defRPr>
     </a:lvl1pPr>
-    <a:lvl2pPr marL="457200" algn="l" defTabSz="914400" rtl="0" eaLnBrk="1" latinLnBrk="0" hangingPunct="1">
+    <a:lvl2pPr marL="457200" algn="l" defTabSz="457200" rtl="0" eaLnBrk="1" latinLnBrk="0" hangingPunct="1">
       <a:defRPr sz="1800" kern="1200">
         <a:solidFill>
           <a:schemeClr val="tx1"/>
@@ -33,7 +33,7 @@
         <a:cs typeface="+mn-cs"/>
       </a:defRPr>
     </a:lvl2pPr>
-    <a:lvl3pPr marL="914400" algn="l" defTabSz="914400" rtl="0" eaLnBrk="1" latinLnBrk="0" hangingPunct="1">
+    <a:lvl3pPr marL="914400" algn="l" defTabSz="457200" rtl="0" eaLnBrk="1" latinLnBrk="0" hangingPunct="1">
       <a:defRPr sz="1800" kern="1200">
         <a:solidFill>
           <a:schemeClr val="tx1"/>
@@ -43,7 +43,7 @@
         <a:cs typeface="+mn-cs"/>
       </a:defRPr>
     </a:lvl3pPr>
-    <a:lvl4pPr marL="1371600" algn="l" defTabSz="914400" rtl="0" eaLnBrk="1" latinLnBrk="0" hangingPunct="1">
+    <a:lvl4pPr marL="1371600" algn="l" defTabSz="457200" rtl="0" eaLnBrk="1" latinLnBrk="0" hangingPunct="1">
       <a:defRPr sz="1800" kern="1200">
         <a:solidFill>
           <a:schemeClr val="tx1"/>
@@ -53,7 +53,7 @@
         <a:cs typeface="+mn-cs"/>
       </a:defRPr>
     </a:lvl4pPr>
-    <a:lvl5pPr marL="1828800" algn="l" defTabSz="914400" rtl="0" eaLnBrk="1" latinLnBrk="0" hangingPunct="1">
+    <a:lvl5pPr marL="1828800" algn="l" defTabSz="457200" rtl="0" eaLnBrk="1" latinLnBrk="0" hangingPunct="1">
       <a:defRPr sz="1800" kern="1200">
         <a:solidFill>
           <a:schemeClr val="tx1"/>
@@ -63,7 +63,7 @@
         <a:cs typeface="+mn-cs"/>
       </a:defRPr>
     </a:lvl5pPr>
-    <a:lvl6pPr marL="2286000" algn="l" defTabSz="914400" rtl="0" eaLnBrk="1" latinLnBrk="0" hangingPunct="1">
+    <a:lvl6pPr marL="2286000" algn="l" defTabSz="457200" rtl="0" eaLnBrk="1" latinLnBrk="0" hangingPunct="1">
       <a:defRPr sz="1800" kern="1200">
         <a:solidFill>
           <a:schemeClr val="tx1"/>
@@ -73,7 +73,7 @@
         <a:cs typeface="+mn-cs"/>
       </a:defRPr>
     </a:lvl6pPr>
-    <a:lvl7pPr marL="2743200" algn="l" defTabSz="914400" rtl="0" eaLnBrk="1" latinLnBrk="0" hangingPunct="1">
+    <a:lvl7pPr marL="2743200" algn="l" defTabSz="457200" rtl="0" eaLnBrk="1" latinLnBrk="0" hangingPunct="1">
       <a:defRPr sz="1800" kern="1200">
         <a:solidFill>
           <a:schemeClr val="tx1"/>
@@ -83,7 +83,7 @@
         <a:cs typeface="+mn-cs"/>
       </a:defRPr>
     </a:lvl7pPr>
-    <a:lvl8pPr marL="3200400" algn="l" defTabSz="914400" rtl="0" eaLnBrk="1" latinLnBrk="0" hangingPunct="1">
+    <a:lvl8pPr marL="3200400" algn="l" defTabSz="457200" rtl="0" eaLnBrk="1" latinLnBrk="0" hangingPunct="1">
       <a:defRPr sz="1800" kern="1200">
         <a:solidFill>
           <a:schemeClr val="tx1"/>
@@ -93,7 +93,7 @@
         <a:cs typeface="+mn-cs"/>
       </a:defRPr>
     </a:lvl8pPr>
-    <a:lvl9pPr marL="3657600" algn="l" defTabSz="914400" rtl="0" eaLnBrk="1" latinLnBrk="0" hangingPunct="1">
+    <a:lvl9pPr marL="3657600" algn="l" defTabSz="457200" rtl="0" eaLnBrk="1" latinLnBrk="0" hangingPunct="1">
       <a:defRPr sz="1800" kern="1200">
         <a:solidFill>
           <a:schemeClr val="tx1"/>
@@ -131,13 +131,7 @@
       </p:grpSpPr>
       <p:sp>
         <p:nvSpPr>
-          <p:cNvPr id="2" name="Title 1">
-            <a:extLst>
-              <a:ext uri="{FF2B5EF4-FFF2-40B4-BE49-F238E27FC236}">
-                <a16:creationId xmlns:a16="http://schemas.microsoft.com/office/drawing/2014/main" id="{6D3F6359-2F8B-20A4-92EF-AD1F9FD97E2B}"/>
-              </a:ext>
-            </a:extLst>
-          </p:cNvPr>
+          <p:cNvPr id="2" name="Title 1"/>
           <p:cNvSpPr>
             <a:spLocks noGrp="1"/>
           </p:cNvSpPr>
@@ -147,15 +141,15 @@
         </p:nvSpPr>
         <p:spPr>
           <a:xfrm>
-            <a:off x="1524000" y="1122363"/>
-            <a:ext cx="9144000" cy="2387600"/>
+            <a:off x="1304925" y="294620"/>
+            <a:ext cx="7829550" cy="626745"/>
           </a:xfrm>
         </p:spPr>
         <p:txBody>
           <a:bodyPr anchor="b"/>
           <a:lstStyle>
             <a:lvl1pPr algn="ctr">
-              <a:defRPr sz="6000"/>
+              <a:defRPr sz="1575"/>
             </a:lvl1pPr>
           </a:lstStyle>
           <a:p>
@@ -163,19 +157,13 @@
               <a:rPr lang="en-US"/>
               <a:t>Click to edit Master title style</a:t>
             </a:r>
-            <a:endParaRPr lang="en-GB"/>
-          </a:p>
-        </p:txBody>
-      </p:sp>
-      <p:sp>
-        <p:nvSpPr>
-          <p:cNvPr id="3" name="Subtitle 2">
-            <a:extLst>
-              <a:ext uri="{FF2B5EF4-FFF2-40B4-BE49-F238E27FC236}">
-                <a16:creationId xmlns:a16="http://schemas.microsoft.com/office/drawing/2014/main" id="{ECB327A8-E2FC-8882-9DCD-9D3ACAC54E5C}"/>
-              </a:ext>
-            </a:extLst>
-          </p:cNvPr>
+            <a:endParaRPr lang="en-US" dirty="0"/>
+          </a:p>
+        </p:txBody>
+      </p:sp>
+      <p:sp>
+        <p:nvSpPr>
+          <p:cNvPr id="3" name="Subtitle 2"/>
           <p:cNvSpPr>
             <a:spLocks noGrp="1"/>
           </p:cNvSpPr>
@@ -185,8 +173,8 @@
         </p:nvSpPr>
         <p:spPr>
           <a:xfrm>
-            <a:off x="1524000" y="3602038"/>
-            <a:ext cx="9144000" cy="1655762"/>
+            <a:off x="1304925" y="945535"/>
+            <a:ext cx="7829550" cy="434638"/>
           </a:xfrm>
         </p:spPr>
         <p:txBody>
@@ -194,39 +182,39 @@
           <a:lstStyle>
             <a:lvl1pPr marL="0" indent="0" algn="ctr">
               <a:buNone/>
-              <a:defRPr sz="2400"/>
+              <a:defRPr sz="630"/>
             </a:lvl1pPr>
-            <a:lvl2pPr marL="457200" indent="0" algn="ctr">
-              <a:buNone/>
-              <a:defRPr sz="2000"/>
+            <a:lvl2pPr marL="120015" indent="0" algn="ctr">
+              <a:buNone/>
+              <a:defRPr sz="525"/>
             </a:lvl2pPr>
-            <a:lvl3pPr marL="914400" indent="0" algn="ctr">
-              <a:buNone/>
-              <a:defRPr sz="1800"/>
+            <a:lvl3pPr marL="240030" indent="0" algn="ctr">
+              <a:buNone/>
+              <a:defRPr sz="472"/>
             </a:lvl3pPr>
-            <a:lvl4pPr marL="1371600" indent="0" algn="ctr">
-              <a:buNone/>
-              <a:defRPr sz="1600"/>
+            <a:lvl4pPr marL="360045" indent="0" algn="ctr">
+              <a:buNone/>
+              <a:defRPr sz="420"/>
             </a:lvl4pPr>
-            <a:lvl5pPr marL="1828800" indent="0" algn="ctr">
-              <a:buNone/>
-              <a:defRPr sz="1600"/>
+            <a:lvl5pPr marL="480060" indent="0" algn="ctr">
+              <a:buNone/>
+              <a:defRPr sz="420"/>
             </a:lvl5pPr>
-            <a:lvl6pPr marL="2286000" indent="0" algn="ctr">
-              <a:buNone/>
-              <a:defRPr sz="1600"/>
+            <a:lvl6pPr marL="600075" indent="0" algn="ctr">
+              <a:buNone/>
+              <a:defRPr sz="420"/>
             </a:lvl6pPr>
-            <a:lvl7pPr marL="2743200" indent="0" algn="ctr">
-              <a:buNone/>
-              <a:defRPr sz="1600"/>
+            <a:lvl7pPr marL="720090" indent="0" algn="ctr">
+              <a:buNone/>
+              <a:defRPr sz="420"/>
             </a:lvl7pPr>
-            <a:lvl8pPr marL="3200400" indent="0" algn="ctr">
-              <a:buNone/>
-              <a:defRPr sz="1600"/>
+            <a:lvl8pPr marL="840105" indent="0" algn="ctr">
+              <a:buNone/>
+              <a:defRPr sz="420"/>
             </a:lvl8pPr>
-            <a:lvl9pPr marL="3657600" indent="0" algn="ctr">
-              <a:buNone/>
-              <a:defRPr sz="1600"/>
+            <a:lvl9pPr marL="960120" indent="0" algn="ctr">
+              <a:buNone/>
+              <a:defRPr sz="420"/>
             </a:lvl9pPr>
           </a:lstStyle>
           <a:p>
@@ -234,19 +222,13 @@
               <a:rPr lang="en-US"/>
               <a:t>Click to edit Master subtitle style</a:t>
             </a:r>
-            <a:endParaRPr lang="en-GB"/>
-          </a:p>
-        </p:txBody>
-      </p:sp>
-      <p:sp>
-        <p:nvSpPr>
-          <p:cNvPr id="4" name="Date Placeholder 3">
-            <a:extLst>
-              <a:ext uri="{FF2B5EF4-FFF2-40B4-BE49-F238E27FC236}">
-                <a16:creationId xmlns:a16="http://schemas.microsoft.com/office/drawing/2014/main" id="{F5AE08E2-AE9E-6F76-14AB-0271D0623509}"/>
-              </a:ext>
-            </a:extLst>
-          </p:cNvPr>
+            <a:endParaRPr lang="en-US" dirty="0"/>
+          </a:p>
+        </p:txBody>
+      </p:sp>
+      <p:sp>
+        <p:nvSpPr>
+          <p:cNvPr id="4" name="Date Placeholder 3"/>
           <p:cNvSpPr>
             <a:spLocks noGrp="1"/>
           </p:cNvSpPr>
@@ -261,7 +243,7 @@
           <a:p>
             <a:fld id="{15D4EB86-B9EA-4611-8686-4A88DEA7CEA4}" type="datetimeFigureOut">
               <a:rPr lang="en-GB" smtClean="0"/>
-              <a:t>03/05/2022</a:t>
+              <a:t>09/05/2022</a:t>
             </a:fld>
             <a:endParaRPr lang="en-GB"/>
           </a:p>
@@ -269,13 +251,7 @@
       </p:sp>
       <p:sp>
         <p:nvSpPr>
-          <p:cNvPr id="5" name="Footer Placeholder 4">
-            <a:extLst>
-              <a:ext uri="{FF2B5EF4-FFF2-40B4-BE49-F238E27FC236}">
-                <a16:creationId xmlns:a16="http://schemas.microsoft.com/office/drawing/2014/main" id="{1D2624CF-DAFC-E0B2-A7C6-18E350130FCA}"/>
-              </a:ext>
-            </a:extLst>
-          </p:cNvPr>
+          <p:cNvPr id="5" name="Footer Placeholder 4"/>
           <p:cNvSpPr>
             <a:spLocks noGrp="1"/>
           </p:cNvSpPr>
@@ -294,13 +270,7 @@
       </p:sp>
       <p:sp>
         <p:nvSpPr>
-          <p:cNvPr id="6" name="Slide Number Placeholder 5">
-            <a:extLst>
-              <a:ext uri="{FF2B5EF4-FFF2-40B4-BE49-F238E27FC236}">
-                <a16:creationId xmlns:a16="http://schemas.microsoft.com/office/drawing/2014/main" id="{61791B24-4A6A-CCFB-E416-2D0B7A5BCD7C}"/>
-              </a:ext>
-            </a:extLst>
-          </p:cNvPr>
+          <p:cNvPr id="6" name="Slide Number Placeholder 5"/>
           <p:cNvSpPr>
             <a:spLocks noGrp="1"/>
           </p:cNvSpPr>
@@ -324,7 +294,7 @@
     </p:spTree>
     <p:extLst>
       <p:ext uri="{BB962C8B-B14F-4D97-AF65-F5344CB8AC3E}">
-        <p14:creationId xmlns:p14="http://schemas.microsoft.com/office/powerpoint/2010/main" val="309037787"/>
+        <p14:creationId xmlns:p14="http://schemas.microsoft.com/office/powerpoint/2010/main" val="3912345606"/>
       </p:ext>
     </p:extLst>
   </p:cSld>
@@ -353,13 +323,7 @@
       </p:grpSpPr>
       <p:sp>
         <p:nvSpPr>
-          <p:cNvPr id="2" name="Title 1">
-            <a:extLst>
-              <a:ext uri="{FF2B5EF4-FFF2-40B4-BE49-F238E27FC236}">
-                <a16:creationId xmlns:a16="http://schemas.microsoft.com/office/drawing/2014/main" id="{92CE1635-A35F-A04F-9178-1BEDDBA2CB5D}"/>
-              </a:ext>
-            </a:extLst>
-          </p:cNvPr>
+          <p:cNvPr id="2" name="Title 1"/>
           <p:cNvSpPr>
             <a:spLocks noGrp="1"/>
           </p:cNvSpPr>
@@ -376,19 +340,13 @@
               <a:rPr lang="en-US"/>
               <a:t>Click to edit Master title style</a:t>
             </a:r>
-            <a:endParaRPr lang="en-GB"/>
-          </a:p>
-        </p:txBody>
-      </p:sp>
-      <p:sp>
-        <p:nvSpPr>
-          <p:cNvPr id="3" name="Vertical Text Placeholder 2">
-            <a:extLst>
-              <a:ext uri="{FF2B5EF4-FFF2-40B4-BE49-F238E27FC236}">
-                <a16:creationId xmlns:a16="http://schemas.microsoft.com/office/drawing/2014/main" id="{22582332-3889-AC0B-26A9-FF2FE20FACDD}"/>
-              </a:ext>
-            </a:extLst>
-          </p:cNvPr>
+            <a:endParaRPr lang="en-US" dirty="0"/>
+          </a:p>
+        </p:txBody>
+      </p:sp>
+      <p:sp>
+        <p:nvSpPr>
+          <p:cNvPr id="3" name="Vertical Text Placeholder 2"/>
           <p:cNvSpPr>
             <a:spLocks noGrp="1"/>
           </p:cNvSpPr>
@@ -434,19 +392,13 @@
               <a:rPr lang="en-US"/>
               <a:t>Fifth level</a:t>
             </a:r>
-            <a:endParaRPr lang="en-GB"/>
-          </a:p>
-        </p:txBody>
-      </p:sp>
-      <p:sp>
-        <p:nvSpPr>
-          <p:cNvPr id="4" name="Date Placeholder 3">
-            <a:extLst>
-              <a:ext uri="{FF2B5EF4-FFF2-40B4-BE49-F238E27FC236}">
-                <a16:creationId xmlns:a16="http://schemas.microsoft.com/office/drawing/2014/main" id="{E1E0B4A1-D97F-84C5-FAA5-CB0D76A761BC}"/>
-              </a:ext>
-            </a:extLst>
-          </p:cNvPr>
+            <a:endParaRPr lang="en-US" dirty="0"/>
+          </a:p>
+        </p:txBody>
+      </p:sp>
+      <p:sp>
+        <p:nvSpPr>
+          <p:cNvPr id="4" name="Date Placeholder 3"/>
           <p:cNvSpPr>
             <a:spLocks noGrp="1"/>
           </p:cNvSpPr>
@@ -461,7 +413,7 @@
           <a:p>
             <a:fld id="{15D4EB86-B9EA-4611-8686-4A88DEA7CEA4}" type="datetimeFigureOut">
               <a:rPr lang="en-GB" smtClean="0"/>
-              <a:t>03/05/2022</a:t>
+              <a:t>09/05/2022</a:t>
             </a:fld>
             <a:endParaRPr lang="en-GB"/>
           </a:p>
@@ -469,13 +421,7 @@
       </p:sp>
       <p:sp>
         <p:nvSpPr>
-          <p:cNvPr id="5" name="Footer Placeholder 4">
-            <a:extLst>
-              <a:ext uri="{FF2B5EF4-FFF2-40B4-BE49-F238E27FC236}">
-                <a16:creationId xmlns:a16="http://schemas.microsoft.com/office/drawing/2014/main" id="{52FD37FA-7C08-F631-A148-4CE5A94F1324}"/>
-              </a:ext>
-            </a:extLst>
-          </p:cNvPr>
+          <p:cNvPr id="5" name="Footer Placeholder 4"/>
           <p:cNvSpPr>
             <a:spLocks noGrp="1"/>
           </p:cNvSpPr>
@@ -494,13 +440,7 @@
       </p:sp>
       <p:sp>
         <p:nvSpPr>
-          <p:cNvPr id="6" name="Slide Number Placeholder 5">
-            <a:extLst>
-              <a:ext uri="{FF2B5EF4-FFF2-40B4-BE49-F238E27FC236}">
-                <a16:creationId xmlns:a16="http://schemas.microsoft.com/office/drawing/2014/main" id="{C197B2AE-8513-3211-2726-26228039EBE1}"/>
-              </a:ext>
-            </a:extLst>
-          </p:cNvPr>
+          <p:cNvPr id="6" name="Slide Number Placeholder 5"/>
           <p:cNvSpPr>
             <a:spLocks noGrp="1"/>
           </p:cNvSpPr>
@@ -524,7 +464,7 @@
     </p:spTree>
     <p:extLst>
       <p:ext uri="{BB962C8B-B14F-4D97-AF65-F5344CB8AC3E}">
-        <p14:creationId xmlns:p14="http://schemas.microsoft.com/office/powerpoint/2010/main" val="3871107696"/>
+        <p14:creationId xmlns:p14="http://schemas.microsoft.com/office/powerpoint/2010/main" val="3936853959"/>
       </p:ext>
     </p:extLst>
   </p:cSld>
@@ -553,13 +493,7 @@
       </p:grpSpPr>
       <p:sp>
         <p:nvSpPr>
-          <p:cNvPr id="2" name="Vertical Title 1">
-            <a:extLst>
-              <a:ext uri="{FF2B5EF4-FFF2-40B4-BE49-F238E27FC236}">
-                <a16:creationId xmlns:a16="http://schemas.microsoft.com/office/drawing/2014/main" id="{5E7F1ACD-0914-4BBD-4FEC-245DA49143CB}"/>
-              </a:ext>
-            </a:extLst>
-          </p:cNvPr>
+          <p:cNvPr id="2" name="Vertical Title 1"/>
           <p:cNvSpPr>
             <a:spLocks noGrp="1"/>
           </p:cNvSpPr>
@@ -569,8 +503,8 @@
         </p:nvSpPr>
         <p:spPr>
           <a:xfrm>
-            <a:off x="8724900" y="365125"/>
-            <a:ext cx="2628900" cy="5811838"/>
+            <a:off x="7470695" y="95846"/>
+            <a:ext cx="2250996" cy="1525607"/>
           </a:xfrm>
         </p:spPr>
         <p:txBody>
@@ -581,19 +515,13 @@
               <a:rPr lang="en-US"/>
               <a:t>Click to edit Master title style</a:t>
             </a:r>
-            <a:endParaRPr lang="en-GB"/>
-          </a:p>
-        </p:txBody>
-      </p:sp>
-      <p:sp>
-        <p:nvSpPr>
-          <p:cNvPr id="3" name="Vertical Text Placeholder 2">
-            <a:extLst>
-              <a:ext uri="{FF2B5EF4-FFF2-40B4-BE49-F238E27FC236}">
-                <a16:creationId xmlns:a16="http://schemas.microsoft.com/office/drawing/2014/main" id="{EBB06DCD-A55F-5B1B-A70A-5F9371C179DD}"/>
-              </a:ext>
-            </a:extLst>
-          </p:cNvPr>
+            <a:endParaRPr lang="en-US" dirty="0"/>
+          </a:p>
+        </p:txBody>
+      </p:sp>
+      <p:sp>
+        <p:nvSpPr>
+          <p:cNvPr id="3" name="Vertical Text Placeholder 2"/>
           <p:cNvSpPr>
             <a:spLocks noGrp="1"/>
           </p:cNvSpPr>
@@ -603,8 +531,8 @@
         </p:nvSpPr>
         <p:spPr>
           <a:xfrm>
-            <a:off x="838200" y="365125"/>
-            <a:ext cx="7734300" cy="5811838"/>
+            <a:off x="717709" y="95846"/>
+            <a:ext cx="6622494" cy="1525607"/>
           </a:xfrm>
         </p:spPr>
         <p:txBody>
@@ -644,19 +572,13 @@
               <a:rPr lang="en-US"/>
               <a:t>Fifth level</a:t>
             </a:r>
-            <a:endParaRPr lang="en-GB"/>
-          </a:p>
-        </p:txBody>
-      </p:sp>
-      <p:sp>
-        <p:nvSpPr>
-          <p:cNvPr id="4" name="Date Placeholder 3">
-            <a:extLst>
-              <a:ext uri="{FF2B5EF4-FFF2-40B4-BE49-F238E27FC236}">
-                <a16:creationId xmlns:a16="http://schemas.microsoft.com/office/drawing/2014/main" id="{4BC4C7A0-CD2D-0CB0-5725-2530DD0F2951}"/>
-              </a:ext>
-            </a:extLst>
-          </p:cNvPr>
+            <a:endParaRPr lang="en-US" dirty="0"/>
+          </a:p>
+        </p:txBody>
+      </p:sp>
+      <p:sp>
+        <p:nvSpPr>
+          <p:cNvPr id="4" name="Date Placeholder 3"/>
           <p:cNvSpPr>
             <a:spLocks noGrp="1"/>
           </p:cNvSpPr>
@@ -671,7 +593,7 @@
           <a:p>
             <a:fld id="{15D4EB86-B9EA-4611-8686-4A88DEA7CEA4}" type="datetimeFigureOut">
               <a:rPr lang="en-GB" smtClean="0"/>
-              <a:t>03/05/2022</a:t>
+              <a:t>09/05/2022</a:t>
             </a:fld>
             <a:endParaRPr lang="en-GB"/>
           </a:p>
@@ -679,13 +601,7 @@
       </p:sp>
       <p:sp>
         <p:nvSpPr>
-          <p:cNvPr id="5" name="Footer Placeholder 4">
-            <a:extLst>
-              <a:ext uri="{FF2B5EF4-FFF2-40B4-BE49-F238E27FC236}">
-                <a16:creationId xmlns:a16="http://schemas.microsoft.com/office/drawing/2014/main" id="{505137E7-4CCC-6F45-4036-A195F9FCE357}"/>
-              </a:ext>
-            </a:extLst>
-          </p:cNvPr>
+          <p:cNvPr id="5" name="Footer Placeholder 4"/>
           <p:cNvSpPr>
             <a:spLocks noGrp="1"/>
           </p:cNvSpPr>
@@ -704,13 +620,7 @@
       </p:sp>
       <p:sp>
         <p:nvSpPr>
-          <p:cNvPr id="6" name="Slide Number Placeholder 5">
-            <a:extLst>
-              <a:ext uri="{FF2B5EF4-FFF2-40B4-BE49-F238E27FC236}">
-                <a16:creationId xmlns:a16="http://schemas.microsoft.com/office/drawing/2014/main" id="{809E2E69-79D9-08B2-3947-CD4E560F3CB6}"/>
-              </a:ext>
-            </a:extLst>
-          </p:cNvPr>
+          <p:cNvPr id="6" name="Slide Number Placeholder 5"/>
           <p:cNvSpPr>
             <a:spLocks noGrp="1"/>
           </p:cNvSpPr>
@@ -734,7 +644,7 @@
     </p:spTree>
     <p:extLst>
       <p:ext uri="{BB962C8B-B14F-4D97-AF65-F5344CB8AC3E}">
-        <p14:creationId xmlns:p14="http://schemas.microsoft.com/office/powerpoint/2010/main" val="1107845278"/>
+        <p14:creationId xmlns:p14="http://schemas.microsoft.com/office/powerpoint/2010/main" val="2777443939"/>
       </p:ext>
     </p:extLst>
   </p:cSld>
@@ -763,13 +673,7 @@
       </p:grpSpPr>
       <p:sp>
         <p:nvSpPr>
-          <p:cNvPr id="2" name="Title 1">
-            <a:extLst>
-              <a:ext uri="{FF2B5EF4-FFF2-40B4-BE49-F238E27FC236}">
-                <a16:creationId xmlns:a16="http://schemas.microsoft.com/office/drawing/2014/main" id="{D0484C7D-75FE-0891-B4F7-71D7F9DA0609}"/>
-              </a:ext>
-            </a:extLst>
-          </p:cNvPr>
+          <p:cNvPr id="2" name="Title 1"/>
           <p:cNvSpPr>
             <a:spLocks noGrp="1"/>
           </p:cNvSpPr>
@@ -786,19 +690,13 @@
               <a:rPr lang="en-US"/>
               <a:t>Click to edit Master title style</a:t>
             </a:r>
-            <a:endParaRPr lang="en-GB"/>
-          </a:p>
-        </p:txBody>
-      </p:sp>
-      <p:sp>
-        <p:nvSpPr>
-          <p:cNvPr id="3" name="Content Placeholder 2">
-            <a:extLst>
-              <a:ext uri="{FF2B5EF4-FFF2-40B4-BE49-F238E27FC236}">
-                <a16:creationId xmlns:a16="http://schemas.microsoft.com/office/drawing/2014/main" id="{715EF77E-611D-9568-C70F-4D57BA9E5836}"/>
-              </a:ext>
-            </a:extLst>
-          </p:cNvPr>
+            <a:endParaRPr lang="en-US" dirty="0"/>
+          </a:p>
+        </p:txBody>
+      </p:sp>
+      <p:sp>
+        <p:nvSpPr>
+          <p:cNvPr id="3" name="Content Placeholder 2"/>
           <p:cNvSpPr>
             <a:spLocks noGrp="1"/>
           </p:cNvSpPr>
@@ -844,19 +742,13 @@
               <a:rPr lang="en-US"/>
               <a:t>Fifth level</a:t>
             </a:r>
-            <a:endParaRPr lang="en-GB"/>
-          </a:p>
-        </p:txBody>
-      </p:sp>
-      <p:sp>
-        <p:nvSpPr>
-          <p:cNvPr id="4" name="Date Placeholder 3">
-            <a:extLst>
-              <a:ext uri="{FF2B5EF4-FFF2-40B4-BE49-F238E27FC236}">
-                <a16:creationId xmlns:a16="http://schemas.microsoft.com/office/drawing/2014/main" id="{BCD8AD67-6FDD-1611-1EC3-557449C27270}"/>
-              </a:ext>
-            </a:extLst>
-          </p:cNvPr>
+            <a:endParaRPr lang="en-US" dirty="0"/>
+          </a:p>
+        </p:txBody>
+      </p:sp>
+      <p:sp>
+        <p:nvSpPr>
+          <p:cNvPr id="4" name="Date Placeholder 3"/>
           <p:cNvSpPr>
             <a:spLocks noGrp="1"/>
           </p:cNvSpPr>
@@ -871,7 +763,7 @@
           <a:p>
             <a:fld id="{15D4EB86-B9EA-4611-8686-4A88DEA7CEA4}" type="datetimeFigureOut">
               <a:rPr lang="en-GB" smtClean="0"/>
-              <a:t>03/05/2022</a:t>
+              <a:t>09/05/2022</a:t>
             </a:fld>
             <a:endParaRPr lang="en-GB"/>
           </a:p>
@@ -879,13 +771,7 @@
       </p:sp>
       <p:sp>
         <p:nvSpPr>
-          <p:cNvPr id="5" name="Footer Placeholder 4">
-            <a:extLst>
-              <a:ext uri="{FF2B5EF4-FFF2-40B4-BE49-F238E27FC236}">
-                <a16:creationId xmlns:a16="http://schemas.microsoft.com/office/drawing/2014/main" id="{944A4303-2FB4-8902-69FE-5BB89C8EDB93}"/>
-              </a:ext>
-            </a:extLst>
-          </p:cNvPr>
+          <p:cNvPr id="5" name="Footer Placeholder 4"/>
           <p:cNvSpPr>
             <a:spLocks noGrp="1"/>
           </p:cNvSpPr>
@@ -904,13 +790,7 @@
       </p:sp>
       <p:sp>
         <p:nvSpPr>
-          <p:cNvPr id="6" name="Slide Number Placeholder 5">
-            <a:extLst>
-              <a:ext uri="{FF2B5EF4-FFF2-40B4-BE49-F238E27FC236}">
-                <a16:creationId xmlns:a16="http://schemas.microsoft.com/office/drawing/2014/main" id="{7A4A37C0-29C1-240B-C141-0EF53AEA5489}"/>
-              </a:ext>
-            </a:extLst>
-          </p:cNvPr>
+          <p:cNvPr id="6" name="Slide Number Placeholder 5"/>
           <p:cNvSpPr>
             <a:spLocks noGrp="1"/>
           </p:cNvSpPr>
@@ -934,7 +814,7 @@
     </p:spTree>
     <p:extLst>
       <p:ext uri="{BB962C8B-B14F-4D97-AF65-F5344CB8AC3E}">
-        <p14:creationId xmlns:p14="http://schemas.microsoft.com/office/powerpoint/2010/main" val="402999226"/>
+        <p14:creationId xmlns:p14="http://schemas.microsoft.com/office/powerpoint/2010/main" val="3512048241"/>
       </p:ext>
     </p:extLst>
   </p:cSld>
@@ -963,13 +843,7 @@
       </p:grpSpPr>
       <p:sp>
         <p:nvSpPr>
-          <p:cNvPr id="2" name="Title 1">
-            <a:extLst>
-              <a:ext uri="{FF2B5EF4-FFF2-40B4-BE49-F238E27FC236}">
-                <a16:creationId xmlns:a16="http://schemas.microsoft.com/office/drawing/2014/main" id="{7A8CC27D-7FCB-AA45-F36D-BE6E81D8F00A}"/>
-              </a:ext>
-            </a:extLst>
-          </p:cNvPr>
+          <p:cNvPr id="2" name="Title 1"/>
           <p:cNvSpPr>
             <a:spLocks noGrp="1"/>
           </p:cNvSpPr>
@@ -979,15 +853,15 @@
         </p:nvSpPr>
         <p:spPr>
           <a:xfrm>
-            <a:off x="831850" y="1709738"/>
-            <a:ext cx="10515600" cy="2852737"/>
+            <a:off x="712271" y="448807"/>
+            <a:ext cx="9003983" cy="748843"/>
           </a:xfrm>
         </p:spPr>
         <p:txBody>
           <a:bodyPr anchor="b"/>
           <a:lstStyle>
             <a:lvl1pPr>
-              <a:defRPr sz="6000"/>
+              <a:defRPr sz="1575"/>
             </a:lvl1pPr>
           </a:lstStyle>
           <a:p>
@@ -995,19 +869,13 @@
               <a:rPr lang="en-US"/>
               <a:t>Click to edit Master title style</a:t>
             </a:r>
-            <a:endParaRPr lang="en-GB"/>
-          </a:p>
-        </p:txBody>
-      </p:sp>
-      <p:sp>
-        <p:nvSpPr>
-          <p:cNvPr id="3" name="Text Placeholder 2">
-            <a:extLst>
-              <a:ext uri="{FF2B5EF4-FFF2-40B4-BE49-F238E27FC236}">
-                <a16:creationId xmlns:a16="http://schemas.microsoft.com/office/drawing/2014/main" id="{9F3147DB-BCD2-C111-9178-4EC73655833F}"/>
-              </a:ext>
-            </a:extLst>
-          </p:cNvPr>
+            <a:endParaRPr lang="en-US" dirty="0"/>
+          </a:p>
+        </p:txBody>
+      </p:sp>
+      <p:sp>
+        <p:nvSpPr>
+          <p:cNvPr id="3" name="Text Placeholder 2"/>
           <p:cNvSpPr>
             <a:spLocks noGrp="1"/>
           </p:cNvSpPr>
@@ -1017,8 +885,8 @@
         </p:nvSpPr>
         <p:spPr>
           <a:xfrm>
-            <a:off x="831850" y="4589463"/>
-            <a:ext cx="10515600" cy="1500187"/>
+            <a:off x="712271" y="1204734"/>
+            <a:ext cx="9003983" cy="393799"/>
           </a:xfrm>
         </p:spPr>
         <p:txBody>
@@ -1026,7 +894,7 @@
           <a:lstStyle>
             <a:lvl1pPr marL="0" indent="0">
               <a:buNone/>
-              <a:defRPr sz="2400">
+              <a:defRPr sz="630">
                 <a:solidFill>
                   <a:schemeClr val="tx1">
                     <a:tint val="75000"/>
@@ -1034,9 +902,9 @@
                 </a:solidFill>
               </a:defRPr>
             </a:lvl1pPr>
-            <a:lvl2pPr marL="457200" indent="0">
-              <a:buNone/>
-              <a:defRPr sz="2000">
+            <a:lvl2pPr marL="120015" indent="0">
+              <a:buNone/>
+              <a:defRPr sz="525">
                 <a:solidFill>
                   <a:schemeClr val="tx1">
                     <a:tint val="75000"/>
@@ -1044,9 +912,9 @@
                 </a:solidFill>
               </a:defRPr>
             </a:lvl2pPr>
-            <a:lvl3pPr marL="914400" indent="0">
-              <a:buNone/>
-              <a:defRPr sz="1800">
+            <a:lvl3pPr marL="240030" indent="0">
+              <a:buNone/>
+              <a:defRPr sz="472">
                 <a:solidFill>
                   <a:schemeClr val="tx1">
                     <a:tint val="75000"/>
@@ -1054,9 +922,9 @@
                 </a:solidFill>
               </a:defRPr>
             </a:lvl3pPr>
-            <a:lvl4pPr marL="1371600" indent="0">
-              <a:buNone/>
-              <a:defRPr sz="1600">
+            <a:lvl4pPr marL="360045" indent="0">
+              <a:buNone/>
+              <a:defRPr sz="420">
                 <a:solidFill>
                   <a:schemeClr val="tx1">
                     <a:tint val="75000"/>
@@ -1064,9 +932,9 @@
                 </a:solidFill>
               </a:defRPr>
             </a:lvl4pPr>
-            <a:lvl5pPr marL="1828800" indent="0">
-              <a:buNone/>
-              <a:defRPr sz="1600">
+            <a:lvl5pPr marL="480060" indent="0">
+              <a:buNone/>
+              <a:defRPr sz="420">
                 <a:solidFill>
                   <a:schemeClr val="tx1">
                     <a:tint val="75000"/>
@@ -1074,9 +942,9 @@
                 </a:solidFill>
               </a:defRPr>
             </a:lvl5pPr>
-            <a:lvl6pPr marL="2286000" indent="0">
-              <a:buNone/>
-              <a:defRPr sz="1600">
+            <a:lvl6pPr marL="600075" indent="0">
+              <a:buNone/>
+              <a:defRPr sz="420">
                 <a:solidFill>
                   <a:schemeClr val="tx1">
                     <a:tint val="75000"/>
@@ -1084,9 +952,9 @@
                 </a:solidFill>
               </a:defRPr>
             </a:lvl6pPr>
-            <a:lvl7pPr marL="2743200" indent="0">
-              <a:buNone/>
-              <a:defRPr sz="1600">
+            <a:lvl7pPr marL="720090" indent="0">
+              <a:buNone/>
+              <a:defRPr sz="420">
                 <a:solidFill>
                   <a:schemeClr val="tx1">
                     <a:tint val="75000"/>
@@ -1094,9 +962,9 @@
                 </a:solidFill>
               </a:defRPr>
             </a:lvl7pPr>
-            <a:lvl8pPr marL="3200400" indent="0">
-              <a:buNone/>
-              <a:defRPr sz="1600">
+            <a:lvl8pPr marL="840105" indent="0">
+              <a:buNone/>
+              <a:defRPr sz="420">
                 <a:solidFill>
                   <a:schemeClr val="tx1">
                     <a:tint val="75000"/>
@@ -1104,9 +972,9 @@
                 </a:solidFill>
               </a:defRPr>
             </a:lvl8pPr>
-            <a:lvl9pPr marL="3657600" indent="0">
-              <a:buNone/>
-              <a:defRPr sz="1600">
+            <a:lvl9pPr marL="960120" indent="0">
+              <a:buNone/>
+              <a:defRPr sz="420">
                 <a:solidFill>
                   <a:schemeClr val="tx1">
                     <a:tint val="75000"/>
@@ -1126,13 +994,7 @@
       </p:sp>
       <p:sp>
         <p:nvSpPr>
-          <p:cNvPr id="4" name="Date Placeholder 3">
-            <a:extLst>
-              <a:ext uri="{FF2B5EF4-FFF2-40B4-BE49-F238E27FC236}">
-                <a16:creationId xmlns:a16="http://schemas.microsoft.com/office/drawing/2014/main" id="{96046572-F4AD-36FC-5D02-A12C06E69C01}"/>
-              </a:ext>
-            </a:extLst>
-          </p:cNvPr>
+          <p:cNvPr id="4" name="Date Placeholder 3"/>
           <p:cNvSpPr>
             <a:spLocks noGrp="1"/>
           </p:cNvSpPr>
@@ -1147,7 +1009,7 @@
           <a:p>
             <a:fld id="{15D4EB86-B9EA-4611-8686-4A88DEA7CEA4}" type="datetimeFigureOut">
               <a:rPr lang="en-GB" smtClean="0"/>
-              <a:t>03/05/2022</a:t>
+              <a:t>09/05/2022</a:t>
             </a:fld>
             <a:endParaRPr lang="en-GB"/>
           </a:p>
@@ -1155,13 +1017,7 @@
       </p:sp>
       <p:sp>
         <p:nvSpPr>
-          <p:cNvPr id="5" name="Footer Placeholder 4">
-            <a:extLst>
-              <a:ext uri="{FF2B5EF4-FFF2-40B4-BE49-F238E27FC236}">
-                <a16:creationId xmlns:a16="http://schemas.microsoft.com/office/drawing/2014/main" id="{64004496-082B-5BA9-9AAC-77B99EE905A6}"/>
-              </a:ext>
-            </a:extLst>
-          </p:cNvPr>
+          <p:cNvPr id="5" name="Footer Placeholder 4"/>
           <p:cNvSpPr>
             <a:spLocks noGrp="1"/>
           </p:cNvSpPr>
@@ -1180,13 +1036,7 @@
       </p:sp>
       <p:sp>
         <p:nvSpPr>
-          <p:cNvPr id="6" name="Slide Number Placeholder 5">
-            <a:extLst>
-              <a:ext uri="{FF2B5EF4-FFF2-40B4-BE49-F238E27FC236}">
-                <a16:creationId xmlns:a16="http://schemas.microsoft.com/office/drawing/2014/main" id="{88A977AB-2A8A-C8DB-EBA1-B8A699367EAC}"/>
-              </a:ext>
-            </a:extLst>
-          </p:cNvPr>
+          <p:cNvPr id="6" name="Slide Number Placeholder 5"/>
           <p:cNvSpPr>
             <a:spLocks noGrp="1"/>
           </p:cNvSpPr>
@@ -1210,7 +1060,7 @@
     </p:spTree>
     <p:extLst>
       <p:ext uri="{BB962C8B-B14F-4D97-AF65-F5344CB8AC3E}">
-        <p14:creationId xmlns:p14="http://schemas.microsoft.com/office/powerpoint/2010/main" val="2408638335"/>
+        <p14:creationId xmlns:p14="http://schemas.microsoft.com/office/powerpoint/2010/main" val="4135466275"/>
       </p:ext>
     </p:extLst>
   </p:cSld>
@@ -1239,13 +1089,7 @@
       </p:grpSpPr>
       <p:sp>
         <p:nvSpPr>
-          <p:cNvPr id="2" name="Title 1">
-            <a:extLst>
-              <a:ext uri="{FF2B5EF4-FFF2-40B4-BE49-F238E27FC236}">
-                <a16:creationId xmlns:a16="http://schemas.microsoft.com/office/drawing/2014/main" id="{BD6359C9-69A0-A8B7-2550-3E1B6EC4D48C}"/>
-              </a:ext>
-            </a:extLst>
-          </p:cNvPr>
+          <p:cNvPr id="2" name="Title 1"/>
           <p:cNvSpPr>
             <a:spLocks noGrp="1"/>
           </p:cNvSpPr>
@@ -1262,19 +1106,13 @@
               <a:rPr lang="en-US"/>
               <a:t>Click to edit Master title style</a:t>
             </a:r>
-            <a:endParaRPr lang="en-GB"/>
-          </a:p>
-        </p:txBody>
-      </p:sp>
-      <p:sp>
-        <p:nvSpPr>
-          <p:cNvPr id="3" name="Content Placeholder 2">
-            <a:extLst>
-              <a:ext uri="{FF2B5EF4-FFF2-40B4-BE49-F238E27FC236}">
-                <a16:creationId xmlns:a16="http://schemas.microsoft.com/office/drawing/2014/main" id="{5F83D762-591B-D0AD-5BFE-0CF6463D56E2}"/>
-              </a:ext>
-            </a:extLst>
-          </p:cNvPr>
+            <a:endParaRPr lang="en-US" dirty="0"/>
+          </a:p>
+        </p:txBody>
+      </p:sp>
+      <p:sp>
+        <p:nvSpPr>
+          <p:cNvPr id="3" name="Content Placeholder 2"/>
           <p:cNvSpPr>
             <a:spLocks noGrp="1"/>
           </p:cNvSpPr>
@@ -1284,8 +1122,8 @@
         </p:nvSpPr>
         <p:spPr>
           <a:xfrm>
-            <a:off x="838200" y="1825625"/>
-            <a:ext cx="5181600" cy="4351338"/>
+            <a:off x="717709" y="479227"/>
+            <a:ext cx="4436745" cy="1142226"/>
           </a:xfrm>
         </p:spPr>
         <p:txBody>
@@ -1325,19 +1163,13 @@
               <a:rPr lang="en-US"/>
               <a:t>Fifth level</a:t>
             </a:r>
-            <a:endParaRPr lang="en-GB"/>
-          </a:p>
-        </p:txBody>
-      </p:sp>
-      <p:sp>
-        <p:nvSpPr>
-          <p:cNvPr id="4" name="Content Placeholder 3">
-            <a:extLst>
-              <a:ext uri="{FF2B5EF4-FFF2-40B4-BE49-F238E27FC236}">
-                <a16:creationId xmlns:a16="http://schemas.microsoft.com/office/drawing/2014/main" id="{3964E228-4971-EA84-7273-682A2AED1436}"/>
-              </a:ext>
-            </a:extLst>
-          </p:cNvPr>
+            <a:endParaRPr lang="en-US" dirty="0"/>
+          </a:p>
+        </p:txBody>
+      </p:sp>
+      <p:sp>
+        <p:nvSpPr>
+          <p:cNvPr id="4" name="Content Placeholder 3"/>
           <p:cNvSpPr>
             <a:spLocks noGrp="1"/>
           </p:cNvSpPr>
@@ -1347,8 +1179,8 @@
         </p:nvSpPr>
         <p:spPr>
           <a:xfrm>
-            <a:off x="6172200" y="1825625"/>
-            <a:ext cx="5181600" cy="4351338"/>
+            <a:off x="5284946" y="479227"/>
+            <a:ext cx="4436745" cy="1142226"/>
           </a:xfrm>
         </p:spPr>
         <p:txBody>
@@ -1388,19 +1220,13 @@
               <a:rPr lang="en-US"/>
               <a:t>Fifth level</a:t>
             </a:r>
-            <a:endParaRPr lang="en-GB"/>
-          </a:p>
-        </p:txBody>
-      </p:sp>
-      <p:sp>
-        <p:nvSpPr>
-          <p:cNvPr id="5" name="Date Placeholder 4">
-            <a:extLst>
-              <a:ext uri="{FF2B5EF4-FFF2-40B4-BE49-F238E27FC236}">
-                <a16:creationId xmlns:a16="http://schemas.microsoft.com/office/drawing/2014/main" id="{33CAFE17-D9E5-9333-61CD-419B84337BC6}"/>
-              </a:ext>
-            </a:extLst>
-          </p:cNvPr>
+            <a:endParaRPr lang="en-US" dirty="0"/>
+          </a:p>
+        </p:txBody>
+      </p:sp>
+      <p:sp>
+        <p:nvSpPr>
+          <p:cNvPr id="5" name="Date Placeholder 4"/>
           <p:cNvSpPr>
             <a:spLocks noGrp="1"/>
           </p:cNvSpPr>
@@ -1415,7 +1241,7 @@
           <a:p>
             <a:fld id="{15D4EB86-B9EA-4611-8686-4A88DEA7CEA4}" type="datetimeFigureOut">
               <a:rPr lang="en-GB" smtClean="0"/>
-              <a:t>03/05/2022</a:t>
+              <a:t>09/05/2022</a:t>
             </a:fld>
             <a:endParaRPr lang="en-GB"/>
           </a:p>
@@ -1423,13 +1249,7 @@
       </p:sp>
       <p:sp>
         <p:nvSpPr>
-          <p:cNvPr id="6" name="Footer Placeholder 5">
-            <a:extLst>
-              <a:ext uri="{FF2B5EF4-FFF2-40B4-BE49-F238E27FC236}">
-                <a16:creationId xmlns:a16="http://schemas.microsoft.com/office/drawing/2014/main" id="{0983CE6B-FCED-8204-3259-B4D875707076}"/>
-              </a:ext>
-            </a:extLst>
-          </p:cNvPr>
+          <p:cNvPr id="6" name="Footer Placeholder 5"/>
           <p:cNvSpPr>
             <a:spLocks noGrp="1"/>
           </p:cNvSpPr>
@@ -1448,13 +1268,7 @@
       </p:sp>
       <p:sp>
         <p:nvSpPr>
-          <p:cNvPr id="7" name="Slide Number Placeholder 6">
-            <a:extLst>
-              <a:ext uri="{FF2B5EF4-FFF2-40B4-BE49-F238E27FC236}">
-                <a16:creationId xmlns:a16="http://schemas.microsoft.com/office/drawing/2014/main" id="{AD36EFBB-CB2B-3F1E-6755-DE2B4C1755E5}"/>
-              </a:ext>
-            </a:extLst>
-          </p:cNvPr>
+          <p:cNvPr id="7" name="Slide Number Placeholder 6"/>
           <p:cNvSpPr>
             <a:spLocks noGrp="1"/>
           </p:cNvSpPr>
@@ -1478,7 +1292,7 @@
     </p:spTree>
     <p:extLst>
       <p:ext uri="{BB962C8B-B14F-4D97-AF65-F5344CB8AC3E}">
-        <p14:creationId xmlns:p14="http://schemas.microsoft.com/office/powerpoint/2010/main" val="3339763989"/>
+        <p14:creationId xmlns:p14="http://schemas.microsoft.com/office/powerpoint/2010/main" val="1176963143"/>
       </p:ext>
     </p:extLst>
   </p:cSld>
@@ -1507,13 +1321,7 @@
       </p:grpSpPr>
       <p:sp>
         <p:nvSpPr>
-          <p:cNvPr id="2" name="Title 1">
-            <a:extLst>
-              <a:ext uri="{FF2B5EF4-FFF2-40B4-BE49-F238E27FC236}">
-                <a16:creationId xmlns:a16="http://schemas.microsoft.com/office/drawing/2014/main" id="{55699FB0-7094-1037-A421-B0E4B82BD499}"/>
-              </a:ext>
-            </a:extLst>
-          </p:cNvPr>
+          <p:cNvPr id="2" name="Title 1"/>
           <p:cNvSpPr>
             <a:spLocks noGrp="1"/>
           </p:cNvSpPr>
@@ -1523,8 +1331,8 @@
         </p:nvSpPr>
         <p:spPr>
           <a:xfrm>
-            <a:off x="839788" y="365125"/>
-            <a:ext cx="10515600" cy="1325563"/>
+            <a:off x="719068" y="95846"/>
+            <a:ext cx="9003983" cy="347960"/>
           </a:xfrm>
         </p:spPr>
         <p:txBody>
@@ -1535,19 +1343,13 @@
               <a:rPr lang="en-US"/>
               <a:t>Click to edit Master title style</a:t>
             </a:r>
-            <a:endParaRPr lang="en-GB"/>
-          </a:p>
-        </p:txBody>
-      </p:sp>
-      <p:sp>
-        <p:nvSpPr>
-          <p:cNvPr id="3" name="Text Placeholder 2">
-            <a:extLst>
-              <a:ext uri="{FF2B5EF4-FFF2-40B4-BE49-F238E27FC236}">
-                <a16:creationId xmlns:a16="http://schemas.microsoft.com/office/drawing/2014/main" id="{26E7B804-EC5C-C1B7-A3C1-CF3A06A7878F}"/>
-              </a:ext>
-            </a:extLst>
-          </p:cNvPr>
+            <a:endParaRPr lang="en-US" dirty="0"/>
+          </a:p>
+        </p:txBody>
+      </p:sp>
+      <p:sp>
+        <p:nvSpPr>
+          <p:cNvPr id="3" name="Text Placeholder 2"/>
           <p:cNvSpPr>
             <a:spLocks noGrp="1"/>
           </p:cNvSpPr>
@@ -1557,8 +1359,8 @@
         </p:nvSpPr>
         <p:spPr>
           <a:xfrm>
-            <a:off x="839788" y="1681163"/>
-            <a:ext cx="5157787" cy="823912"/>
+            <a:off x="719069" y="441305"/>
+            <a:ext cx="4416355" cy="216277"/>
           </a:xfrm>
         </p:spPr>
         <p:txBody>
@@ -1566,39 +1368,39 @@
           <a:lstStyle>
             <a:lvl1pPr marL="0" indent="0">
               <a:buNone/>
-              <a:defRPr sz="2400" b="1"/>
+              <a:defRPr sz="630" b="1"/>
             </a:lvl1pPr>
-            <a:lvl2pPr marL="457200" indent="0">
-              <a:buNone/>
-              <a:defRPr sz="2000" b="1"/>
+            <a:lvl2pPr marL="120015" indent="0">
+              <a:buNone/>
+              <a:defRPr sz="525" b="1"/>
             </a:lvl2pPr>
-            <a:lvl3pPr marL="914400" indent="0">
-              <a:buNone/>
-              <a:defRPr sz="1800" b="1"/>
+            <a:lvl3pPr marL="240030" indent="0">
+              <a:buNone/>
+              <a:defRPr sz="472" b="1"/>
             </a:lvl3pPr>
-            <a:lvl4pPr marL="1371600" indent="0">
-              <a:buNone/>
-              <a:defRPr sz="1600" b="1"/>
+            <a:lvl4pPr marL="360045" indent="0">
+              <a:buNone/>
+              <a:defRPr sz="420" b="1"/>
             </a:lvl4pPr>
-            <a:lvl5pPr marL="1828800" indent="0">
-              <a:buNone/>
-              <a:defRPr sz="1600" b="1"/>
+            <a:lvl5pPr marL="480060" indent="0">
+              <a:buNone/>
+              <a:defRPr sz="420" b="1"/>
             </a:lvl5pPr>
-            <a:lvl6pPr marL="2286000" indent="0">
-              <a:buNone/>
-              <a:defRPr sz="1600" b="1"/>
+            <a:lvl6pPr marL="600075" indent="0">
+              <a:buNone/>
+              <a:defRPr sz="420" b="1"/>
             </a:lvl6pPr>
-            <a:lvl7pPr marL="2743200" indent="0">
-              <a:buNone/>
-              <a:defRPr sz="1600" b="1"/>
+            <a:lvl7pPr marL="720090" indent="0">
+              <a:buNone/>
+              <a:defRPr sz="420" b="1"/>
             </a:lvl7pPr>
-            <a:lvl8pPr marL="3200400" indent="0">
-              <a:buNone/>
-              <a:defRPr sz="1600" b="1"/>
+            <a:lvl8pPr marL="840105" indent="0">
+              <a:buNone/>
+              <a:defRPr sz="420" b="1"/>
             </a:lvl8pPr>
-            <a:lvl9pPr marL="3657600" indent="0">
-              <a:buNone/>
-              <a:defRPr sz="1600" b="1"/>
+            <a:lvl9pPr marL="960120" indent="0">
+              <a:buNone/>
+              <a:defRPr sz="420" b="1"/>
             </a:lvl9pPr>
           </a:lstStyle>
           <a:p>
@@ -1612,13 +1414,7 @@
       </p:sp>
       <p:sp>
         <p:nvSpPr>
-          <p:cNvPr id="4" name="Content Placeholder 3">
-            <a:extLst>
-              <a:ext uri="{FF2B5EF4-FFF2-40B4-BE49-F238E27FC236}">
-                <a16:creationId xmlns:a16="http://schemas.microsoft.com/office/drawing/2014/main" id="{4281B7B9-0A85-D79F-1430-BB64C484BA72}"/>
-              </a:ext>
-            </a:extLst>
-          </p:cNvPr>
+          <p:cNvPr id="4" name="Content Placeholder 3"/>
           <p:cNvSpPr>
             <a:spLocks noGrp="1"/>
           </p:cNvSpPr>
@@ -1628,8 +1424,8 @@
         </p:nvSpPr>
         <p:spPr>
           <a:xfrm>
-            <a:off x="839788" y="2505075"/>
-            <a:ext cx="5157787" cy="3684588"/>
+            <a:off x="719069" y="657582"/>
+            <a:ext cx="4416355" cy="967204"/>
           </a:xfrm>
         </p:spPr>
         <p:txBody>
@@ -1669,19 +1465,13 @@
               <a:rPr lang="en-US"/>
               <a:t>Fifth level</a:t>
             </a:r>
-            <a:endParaRPr lang="en-GB"/>
-          </a:p>
-        </p:txBody>
-      </p:sp>
-      <p:sp>
-        <p:nvSpPr>
-          <p:cNvPr id="5" name="Text Placeholder 4">
-            <a:extLst>
-              <a:ext uri="{FF2B5EF4-FFF2-40B4-BE49-F238E27FC236}">
-                <a16:creationId xmlns:a16="http://schemas.microsoft.com/office/drawing/2014/main" id="{15B8B707-2B43-B623-C521-99A53AFF9B88}"/>
-              </a:ext>
-            </a:extLst>
-          </p:cNvPr>
+            <a:endParaRPr lang="en-US" dirty="0"/>
+          </a:p>
+        </p:txBody>
+      </p:sp>
+      <p:sp>
+        <p:nvSpPr>
+          <p:cNvPr id="5" name="Text Placeholder 4"/>
           <p:cNvSpPr>
             <a:spLocks noGrp="1"/>
           </p:cNvSpPr>
@@ -1691,8 +1481,8 @@
         </p:nvSpPr>
         <p:spPr>
           <a:xfrm>
-            <a:off x="6172200" y="1681163"/>
-            <a:ext cx="5183188" cy="823912"/>
+            <a:off x="5284946" y="441305"/>
+            <a:ext cx="4438105" cy="216277"/>
           </a:xfrm>
         </p:spPr>
         <p:txBody>
@@ -1700,39 +1490,39 @@
           <a:lstStyle>
             <a:lvl1pPr marL="0" indent="0">
               <a:buNone/>
-              <a:defRPr sz="2400" b="1"/>
+              <a:defRPr sz="630" b="1"/>
             </a:lvl1pPr>
-            <a:lvl2pPr marL="457200" indent="0">
-              <a:buNone/>
-              <a:defRPr sz="2000" b="1"/>
+            <a:lvl2pPr marL="120015" indent="0">
+              <a:buNone/>
+              <a:defRPr sz="525" b="1"/>
             </a:lvl2pPr>
-            <a:lvl3pPr marL="914400" indent="0">
-              <a:buNone/>
-              <a:defRPr sz="1800" b="1"/>
+            <a:lvl3pPr marL="240030" indent="0">
+              <a:buNone/>
+              <a:defRPr sz="472" b="1"/>
             </a:lvl3pPr>
-            <a:lvl4pPr marL="1371600" indent="0">
-              <a:buNone/>
-              <a:defRPr sz="1600" b="1"/>
+            <a:lvl4pPr marL="360045" indent="0">
+              <a:buNone/>
+              <a:defRPr sz="420" b="1"/>
             </a:lvl4pPr>
-            <a:lvl5pPr marL="1828800" indent="0">
-              <a:buNone/>
-              <a:defRPr sz="1600" b="1"/>
+            <a:lvl5pPr marL="480060" indent="0">
+              <a:buNone/>
+              <a:defRPr sz="420" b="1"/>
             </a:lvl5pPr>
-            <a:lvl6pPr marL="2286000" indent="0">
-              <a:buNone/>
-              <a:defRPr sz="1600" b="1"/>
+            <a:lvl6pPr marL="600075" indent="0">
+              <a:buNone/>
+              <a:defRPr sz="420" b="1"/>
             </a:lvl6pPr>
-            <a:lvl7pPr marL="2743200" indent="0">
-              <a:buNone/>
-              <a:defRPr sz="1600" b="1"/>
+            <a:lvl7pPr marL="720090" indent="0">
+              <a:buNone/>
+              <a:defRPr sz="420" b="1"/>
             </a:lvl7pPr>
-            <a:lvl8pPr marL="3200400" indent="0">
-              <a:buNone/>
-              <a:defRPr sz="1600" b="1"/>
+            <a:lvl8pPr marL="840105" indent="0">
+              <a:buNone/>
+              <a:defRPr sz="420" b="1"/>
             </a:lvl8pPr>
-            <a:lvl9pPr marL="3657600" indent="0">
-              <a:buNone/>
-              <a:defRPr sz="1600" b="1"/>
+            <a:lvl9pPr marL="960120" indent="0">
+              <a:buNone/>
+              <a:defRPr sz="420" b="1"/>
             </a:lvl9pPr>
           </a:lstStyle>
           <a:p>
@@ -1746,13 +1536,7 @@
       </p:sp>
       <p:sp>
         <p:nvSpPr>
-          <p:cNvPr id="6" name="Content Placeholder 5">
-            <a:extLst>
-              <a:ext uri="{FF2B5EF4-FFF2-40B4-BE49-F238E27FC236}">
-                <a16:creationId xmlns:a16="http://schemas.microsoft.com/office/drawing/2014/main" id="{7EF0EA9F-FFE7-6B3C-2946-C311ACBD9882}"/>
-              </a:ext>
-            </a:extLst>
-          </p:cNvPr>
+          <p:cNvPr id="6" name="Content Placeholder 5"/>
           <p:cNvSpPr>
             <a:spLocks noGrp="1"/>
           </p:cNvSpPr>
@@ -1762,8 +1546,8 @@
         </p:nvSpPr>
         <p:spPr>
           <a:xfrm>
-            <a:off x="6172200" y="2505075"/>
-            <a:ext cx="5183188" cy="3684588"/>
+            <a:off x="5284946" y="657582"/>
+            <a:ext cx="4438105" cy="967204"/>
           </a:xfrm>
         </p:spPr>
         <p:txBody>
@@ -1803,19 +1587,13 @@
               <a:rPr lang="en-US"/>
               <a:t>Fifth level</a:t>
             </a:r>
-            <a:endParaRPr lang="en-GB"/>
-          </a:p>
-        </p:txBody>
-      </p:sp>
-      <p:sp>
-        <p:nvSpPr>
-          <p:cNvPr id="7" name="Date Placeholder 6">
-            <a:extLst>
-              <a:ext uri="{FF2B5EF4-FFF2-40B4-BE49-F238E27FC236}">
-                <a16:creationId xmlns:a16="http://schemas.microsoft.com/office/drawing/2014/main" id="{D9519238-200F-5B0B-EE13-713B47D9C51B}"/>
-              </a:ext>
-            </a:extLst>
-          </p:cNvPr>
+            <a:endParaRPr lang="en-US" dirty="0"/>
+          </a:p>
+        </p:txBody>
+      </p:sp>
+      <p:sp>
+        <p:nvSpPr>
+          <p:cNvPr id="7" name="Date Placeholder 6"/>
           <p:cNvSpPr>
             <a:spLocks noGrp="1"/>
           </p:cNvSpPr>
@@ -1830,7 +1608,7 @@
           <a:p>
             <a:fld id="{15D4EB86-B9EA-4611-8686-4A88DEA7CEA4}" type="datetimeFigureOut">
               <a:rPr lang="en-GB" smtClean="0"/>
-              <a:t>03/05/2022</a:t>
+              <a:t>09/05/2022</a:t>
             </a:fld>
             <a:endParaRPr lang="en-GB"/>
           </a:p>
@@ -1838,13 +1616,7 @@
       </p:sp>
       <p:sp>
         <p:nvSpPr>
-          <p:cNvPr id="8" name="Footer Placeholder 7">
-            <a:extLst>
-              <a:ext uri="{FF2B5EF4-FFF2-40B4-BE49-F238E27FC236}">
-                <a16:creationId xmlns:a16="http://schemas.microsoft.com/office/drawing/2014/main" id="{7E4611FC-57FB-0FD4-D0BC-2EF4F3A0AB24}"/>
-              </a:ext>
-            </a:extLst>
-          </p:cNvPr>
+          <p:cNvPr id="8" name="Footer Placeholder 7"/>
           <p:cNvSpPr>
             <a:spLocks noGrp="1"/>
           </p:cNvSpPr>
@@ -1863,13 +1635,7 @@
       </p:sp>
       <p:sp>
         <p:nvSpPr>
-          <p:cNvPr id="9" name="Slide Number Placeholder 8">
-            <a:extLst>
-              <a:ext uri="{FF2B5EF4-FFF2-40B4-BE49-F238E27FC236}">
-                <a16:creationId xmlns:a16="http://schemas.microsoft.com/office/drawing/2014/main" id="{6B9A0CAF-74EA-7D16-7BC0-4E1399E4AAFC}"/>
-              </a:ext>
-            </a:extLst>
-          </p:cNvPr>
+          <p:cNvPr id="9" name="Slide Number Placeholder 8"/>
           <p:cNvSpPr>
             <a:spLocks noGrp="1"/>
           </p:cNvSpPr>
@@ -1893,7 +1659,7 @@
     </p:spTree>
     <p:extLst>
       <p:ext uri="{BB962C8B-B14F-4D97-AF65-F5344CB8AC3E}">
-        <p14:creationId xmlns:p14="http://schemas.microsoft.com/office/powerpoint/2010/main" val="106188793"/>
+        <p14:creationId xmlns:p14="http://schemas.microsoft.com/office/powerpoint/2010/main" val="260368201"/>
       </p:ext>
     </p:extLst>
   </p:cSld>
@@ -1922,13 +1688,7 @@
       </p:grpSpPr>
       <p:sp>
         <p:nvSpPr>
-          <p:cNvPr id="2" name="Title 1">
-            <a:extLst>
-              <a:ext uri="{FF2B5EF4-FFF2-40B4-BE49-F238E27FC236}">
-                <a16:creationId xmlns:a16="http://schemas.microsoft.com/office/drawing/2014/main" id="{6AD0D6C4-34EE-CCE8-658C-EB46FA3DFB56}"/>
-              </a:ext>
-            </a:extLst>
-          </p:cNvPr>
+          <p:cNvPr id="2" name="Title 1"/>
           <p:cNvSpPr>
             <a:spLocks noGrp="1"/>
           </p:cNvSpPr>
@@ -1945,19 +1705,13 @@
               <a:rPr lang="en-US"/>
               <a:t>Click to edit Master title style</a:t>
             </a:r>
-            <a:endParaRPr lang="en-GB"/>
-          </a:p>
-        </p:txBody>
-      </p:sp>
-      <p:sp>
-        <p:nvSpPr>
-          <p:cNvPr id="3" name="Date Placeholder 2">
-            <a:extLst>
-              <a:ext uri="{FF2B5EF4-FFF2-40B4-BE49-F238E27FC236}">
-                <a16:creationId xmlns:a16="http://schemas.microsoft.com/office/drawing/2014/main" id="{9E20CEC7-2673-8C7D-E6B7-F28E844FB51A}"/>
-              </a:ext>
-            </a:extLst>
-          </p:cNvPr>
+            <a:endParaRPr lang="en-US" dirty="0"/>
+          </a:p>
+        </p:txBody>
+      </p:sp>
+      <p:sp>
+        <p:nvSpPr>
+          <p:cNvPr id="3" name="Date Placeholder 2"/>
           <p:cNvSpPr>
             <a:spLocks noGrp="1"/>
           </p:cNvSpPr>
@@ -1972,7 +1726,7 @@
           <a:p>
             <a:fld id="{15D4EB86-B9EA-4611-8686-4A88DEA7CEA4}" type="datetimeFigureOut">
               <a:rPr lang="en-GB" smtClean="0"/>
-              <a:t>03/05/2022</a:t>
+              <a:t>09/05/2022</a:t>
             </a:fld>
             <a:endParaRPr lang="en-GB"/>
           </a:p>
@@ -1980,13 +1734,7 @@
       </p:sp>
       <p:sp>
         <p:nvSpPr>
-          <p:cNvPr id="4" name="Footer Placeholder 3">
-            <a:extLst>
-              <a:ext uri="{FF2B5EF4-FFF2-40B4-BE49-F238E27FC236}">
-                <a16:creationId xmlns:a16="http://schemas.microsoft.com/office/drawing/2014/main" id="{7D9F14FC-2E15-94C4-1E93-8A5A65F43042}"/>
-              </a:ext>
-            </a:extLst>
-          </p:cNvPr>
+          <p:cNvPr id="4" name="Footer Placeholder 3"/>
           <p:cNvSpPr>
             <a:spLocks noGrp="1"/>
           </p:cNvSpPr>
@@ -2005,13 +1753,7 @@
       </p:sp>
       <p:sp>
         <p:nvSpPr>
-          <p:cNvPr id="5" name="Slide Number Placeholder 4">
-            <a:extLst>
-              <a:ext uri="{FF2B5EF4-FFF2-40B4-BE49-F238E27FC236}">
-                <a16:creationId xmlns:a16="http://schemas.microsoft.com/office/drawing/2014/main" id="{EADBF732-6847-7359-98AC-E00A6886AAD8}"/>
-              </a:ext>
-            </a:extLst>
-          </p:cNvPr>
+          <p:cNvPr id="5" name="Slide Number Placeholder 4"/>
           <p:cNvSpPr>
             <a:spLocks noGrp="1"/>
           </p:cNvSpPr>
@@ -2035,7 +1777,7 @@
     </p:spTree>
     <p:extLst>
       <p:ext uri="{BB962C8B-B14F-4D97-AF65-F5344CB8AC3E}">
-        <p14:creationId xmlns:p14="http://schemas.microsoft.com/office/powerpoint/2010/main" val="958061710"/>
+        <p14:creationId xmlns:p14="http://schemas.microsoft.com/office/powerpoint/2010/main" val="3873231582"/>
       </p:ext>
     </p:extLst>
   </p:cSld>
@@ -2064,13 +1806,7 @@
       </p:grpSpPr>
       <p:sp>
         <p:nvSpPr>
-          <p:cNvPr id="2" name="Date Placeholder 1">
-            <a:extLst>
-              <a:ext uri="{FF2B5EF4-FFF2-40B4-BE49-F238E27FC236}">
-                <a16:creationId xmlns:a16="http://schemas.microsoft.com/office/drawing/2014/main" id="{CC7E977B-D527-9F8A-2165-1725AFE90211}"/>
-              </a:ext>
-            </a:extLst>
-          </p:cNvPr>
+          <p:cNvPr id="2" name="Date Placeholder 1"/>
           <p:cNvSpPr>
             <a:spLocks noGrp="1"/>
           </p:cNvSpPr>
@@ -2085,7 +1821,7 @@
           <a:p>
             <a:fld id="{15D4EB86-B9EA-4611-8686-4A88DEA7CEA4}" type="datetimeFigureOut">
               <a:rPr lang="en-GB" smtClean="0"/>
-              <a:t>03/05/2022</a:t>
+              <a:t>09/05/2022</a:t>
             </a:fld>
             <a:endParaRPr lang="en-GB"/>
           </a:p>
@@ -2093,13 +1829,7 @@
       </p:sp>
       <p:sp>
         <p:nvSpPr>
-          <p:cNvPr id="3" name="Footer Placeholder 2">
-            <a:extLst>
-              <a:ext uri="{FF2B5EF4-FFF2-40B4-BE49-F238E27FC236}">
-                <a16:creationId xmlns:a16="http://schemas.microsoft.com/office/drawing/2014/main" id="{52E9E09D-1F70-DA4D-8171-8731340A6310}"/>
-              </a:ext>
-            </a:extLst>
-          </p:cNvPr>
+          <p:cNvPr id="3" name="Footer Placeholder 2"/>
           <p:cNvSpPr>
             <a:spLocks noGrp="1"/>
           </p:cNvSpPr>
@@ -2118,13 +1848,7 @@
       </p:sp>
       <p:sp>
         <p:nvSpPr>
-          <p:cNvPr id="4" name="Slide Number Placeholder 3">
-            <a:extLst>
-              <a:ext uri="{FF2B5EF4-FFF2-40B4-BE49-F238E27FC236}">
-                <a16:creationId xmlns:a16="http://schemas.microsoft.com/office/drawing/2014/main" id="{C7FD2A94-A8F4-3AE8-9068-13DA045733EC}"/>
-              </a:ext>
-            </a:extLst>
-          </p:cNvPr>
+          <p:cNvPr id="4" name="Slide Number Placeholder 3"/>
           <p:cNvSpPr>
             <a:spLocks noGrp="1"/>
           </p:cNvSpPr>
@@ -2148,7 +1872,7 @@
     </p:spTree>
     <p:extLst>
       <p:ext uri="{BB962C8B-B14F-4D97-AF65-F5344CB8AC3E}">
-        <p14:creationId xmlns:p14="http://schemas.microsoft.com/office/powerpoint/2010/main" val="4073496706"/>
+        <p14:creationId xmlns:p14="http://schemas.microsoft.com/office/powerpoint/2010/main" val="1146741497"/>
       </p:ext>
     </p:extLst>
   </p:cSld>
@@ -2177,13 +1901,7 @@
       </p:grpSpPr>
       <p:sp>
         <p:nvSpPr>
-          <p:cNvPr id="2" name="Title 1">
-            <a:extLst>
-              <a:ext uri="{FF2B5EF4-FFF2-40B4-BE49-F238E27FC236}">
-                <a16:creationId xmlns:a16="http://schemas.microsoft.com/office/drawing/2014/main" id="{447E3E86-A5D6-4796-75BA-CDA22C887E0C}"/>
-              </a:ext>
-            </a:extLst>
-          </p:cNvPr>
+          <p:cNvPr id="2" name="Title 1"/>
           <p:cNvSpPr>
             <a:spLocks noGrp="1"/>
           </p:cNvSpPr>
@@ -2193,15 +1911,15 @@
         </p:nvSpPr>
         <p:spPr>
           <a:xfrm>
-            <a:off x="839788" y="457200"/>
-            <a:ext cx="3932237" cy="1600200"/>
+            <a:off x="719069" y="120015"/>
+            <a:ext cx="3366978" cy="420053"/>
           </a:xfrm>
         </p:spPr>
         <p:txBody>
           <a:bodyPr anchor="b"/>
           <a:lstStyle>
             <a:lvl1pPr>
-              <a:defRPr sz="3200"/>
+              <a:defRPr sz="840"/>
             </a:lvl1pPr>
           </a:lstStyle>
           <a:p>
@@ -2209,19 +1927,13 @@
               <a:rPr lang="en-US"/>
               <a:t>Click to edit Master title style</a:t>
             </a:r>
-            <a:endParaRPr lang="en-GB"/>
-          </a:p>
-        </p:txBody>
-      </p:sp>
-      <p:sp>
-        <p:nvSpPr>
-          <p:cNvPr id="3" name="Content Placeholder 2">
-            <a:extLst>
-              <a:ext uri="{FF2B5EF4-FFF2-40B4-BE49-F238E27FC236}">
-                <a16:creationId xmlns:a16="http://schemas.microsoft.com/office/drawing/2014/main" id="{AA39CFAA-1A24-800F-C25C-BD242B59A39D}"/>
-              </a:ext>
-            </a:extLst>
-          </p:cNvPr>
+            <a:endParaRPr lang="en-US" dirty="0"/>
+          </a:p>
+        </p:txBody>
+      </p:sp>
+      <p:sp>
+        <p:nvSpPr>
+          <p:cNvPr id="3" name="Content Placeholder 2"/>
           <p:cNvSpPr>
             <a:spLocks noGrp="1"/>
           </p:cNvSpPr>
@@ -2231,39 +1943,39 @@
         </p:nvSpPr>
         <p:spPr>
           <a:xfrm>
-            <a:off x="5183188" y="987425"/>
-            <a:ext cx="6172200" cy="4873625"/>
+            <a:off x="4438105" y="259199"/>
+            <a:ext cx="5284946" cy="1279327"/>
           </a:xfrm>
         </p:spPr>
         <p:txBody>
           <a:bodyPr/>
           <a:lstStyle>
             <a:lvl1pPr>
-              <a:defRPr sz="3200"/>
+              <a:defRPr sz="840"/>
             </a:lvl1pPr>
             <a:lvl2pPr>
-              <a:defRPr sz="2800"/>
+              <a:defRPr sz="735"/>
             </a:lvl2pPr>
             <a:lvl3pPr>
-              <a:defRPr sz="2400"/>
+              <a:defRPr sz="630"/>
             </a:lvl3pPr>
             <a:lvl4pPr>
-              <a:defRPr sz="2000"/>
+              <a:defRPr sz="525"/>
             </a:lvl4pPr>
             <a:lvl5pPr>
-              <a:defRPr sz="2000"/>
+              <a:defRPr sz="525"/>
             </a:lvl5pPr>
             <a:lvl6pPr>
-              <a:defRPr sz="2000"/>
+              <a:defRPr sz="525"/>
             </a:lvl6pPr>
             <a:lvl7pPr>
-              <a:defRPr sz="2000"/>
+              <a:defRPr sz="525"/>
             </a:lvl7pPr>
             <a:lvl8pPr>
-              <a:defRPr sz="2000"/>
+              <a:defRPr sz="525"/>
             </a:lvl8pPr>
             <a:lvl9pPr>
-              <a:defRPr sz="2000"/>
+              <a:defRPr sz="525"/>
             </a:lvl9pPr>
           </a:lstStyle>
           <a:p>
@@ -2300,19 +2012,13 @@
               <a:rPr lang="en-US"/>
               <a:t>Fifth level</a:t>
             </a:r>
-            <a:endParaRPr lang="en-GB"/>
-          </a:p>
-        </p:txBody>
-      </p:sp>
-      <p:sp>
-        <p:nvSpPr>
-          <p:cNvPr id="4" name="Text Placeholder 3">
-            <a:extLst>
-              <a:ext uri="{FF2B5EF4-FFF2-40B4-BE49-F238E27FC236}">
-                <a16:creationId xmlns:a16="http://schemas.microsoft.com/office/drawing/2014/main" id="{2BA4EAAB-114E-4385-88AE-01E25CC230DE}"/>
-              </a:ext>
-            </a:extLst>
-          </p:cNvPr>
+            <a:endParaRPr lang="en-US" dirty="0"/>
+          </a:p>
+        </p:txBody>
+      </p:sp>
+      <p:sp>
+        <p:nvSpPr>
+          <p:cNvPr id="4" name="Text Placeholder 3"/>
           <p:cNvSpPr>
             <a:spLocks noGrp="1"/>
           </p:cNvSpPr>
@@ -2322,8 +2028,8 @@
         </p:nvSpPr>
         <p:spPr>
           <a:xfrm>
-            <a:off x="839788" y="2057400"/>
-            <a:ext cx="3932237" cy="3811588"/>
+            <a:off x="719069" y="540067"/>
+            <a:ext cx="3366978" cy="1000542"/>
           </a:xfrm>
         </p:spPr>
         <p:txBody>
@@ -2331,39 +2037,39 @@
           <a:lstStyle>
             <a:lvl1pPr marL="0" indent="0">
               <a:buNone/>
-              <a:defRPr sz="1600"/>
+              <a:defRPr sz="420"/>
             </a:lvl1pPr>
-            <a:lvl2pPr marL="457200" indent="0">
-              <a:buNone/>
-              <a:defRPr sz="1400"/>
+            <a:lvl2pPr marL="120015" indent="0">
+              <a:buNone/>
+              <a:defRPr sz="368"/>
             </a:lvl2pPr>
-            <a:lvl3pPr marL="914400" indent="0">
-              <a:buNone/>
-              <a:defRPr sz="1200"/>
+            <a:lvl3pPr marL="240030" indent="0">
+              <a:buNone/>
+              <a:defRPr sz="315"/>
             </a:lvl3pPr>
-            <a:lvl4pPr marL="1371600" indent="0">
-              <a:buNone/>
-              <a:defRPr sz="1000"/>
+            <a:lvl4pPr marL="360045" indent="0">
+              <a:buNone/>
+              <a:defRPr sz="263"/>
             </a:lvl4pPr>
-            <a:lvl5pPr marL="1828800" indent="0">
-              <a:buNone/>
-              <a:defRPr sz="1000"/>
+            <a:lvl5pPr marL="480060" indent="0">
+              <a:buNone/>
+              <a:defRPr sz="263"/>
             </a:lvl5pPr>
-            <a:lvl6pPr marL="2286000" indent="0">
-              <a:buNone/>
-              <a:defRPr sz="1000"/>
+            <a:lvl6pPr marL="600075" indent="0">
+              <a:buNone/>
+              <a:defRPr sz="263"/>
             </a:lvl6pPr>
-            <a:lvl7pPr marL="2743200" indent="0">
-              <a:buNone/>
-              <a:defRPr sz="1000"/>
+            <a:lvl7pPr marL="720090" indent="0">
+              <a:buNone/>
+              <a:defRPr sz="263"/>
             </a:lvl7pPr>
-            <a:lvl8pPr marL="3200400" indent="0">
-              <a:buNone/>
-              <a:defRPr sz="1000"/>
+            <a:lvl8pPr marL="840105" indent="0">
+              <a:buNone/>
+              <a:defRPr sz="263"/>
             </a:lvl8pPr>
-            <a:lvl9pPr marL="3657600" indent="0">
-              <a:buNone/>
-              <a:defRPr sz="1000"/>
+            <a:lvl9pPr marL="960120" indent="0">
+              <a:buNone/>
+              <a:defRPr sz="263"/>
             </a:lvl9pPr>
           </a:lstStyle>
           <a:p>
@@ -2377,13 +2083,7 @@
       </p:sp>
       <p:sp>
         <p:nvSpPr>
-          <p:cNvPr id="5" name="Date Placeholder 4">
-            <a:extLst>
-              <a:ext uri="{FF2B5EF4-FFF2-40B4-BE49-F238E27FC236}">
-                <a16:creationId xmlns:a16="http://schemas.microsoft.com/office/drawing/2014/main" id="{998988F3-5C52-9308-CF88-264A12BA5434}"/>
-              </a:ext>
-            </a:extLst>
-          </p:cNvPr>
+          <p:cNvPr id="5" name="Date Placeholder 4"/>
           <p:cNvSpPr>
             <a:spLocks noGrp="1"/>
           </p:cNvSpPr>
@@ -2398,7 +2098,7 @@
           <a:p>
             <a:fld id="{15D4EB86-B9EA-4611-8686-4A88DEA7CEA4}" type="datetimeFigureOut">
               <a:rPr lang="en-GB" smtClean="0"/>
-              <a:t>03/05/2022</a:t>
+              <a:t>09/05/2022</a:t>
             </a:fld>
             <a:endParaRPr lang="en-GB"/>
           </a:p>
@@ -2406,13 +2106,7 @@
       </p:sp>
       <p:sp>
         <p:nvSpPr>
-          <p:cNvPr id="6" name="Footer Placeholder 5">
-            <a:extLst>
-              <a:ext uri="{FF2B5EF4-FFF2-40B4-BE49-F238E27FC236}">
-                <a16:creationId xmlns:a16="http://schemas.microsoft.com/office/drawing/2014/main" id="{B9142B6C-FAF7-D9E2-AB27-D309030F120B}"/>
-              </a:ext>
-            </a:extLst>
-          </p:cNvPr>
+          <p:cNvPr id="6" name="Footer Placeholder 5"/>
           <p:cNvSpPr>
             <a:spLocks noGrp="1"/>
           </p:cNvSpPr>
@@ -2431,13 +2125,7 @@
       </p:sp>
       <p:sp>
         <p:nvSpPr>
-          <p:cNvPr id="7" name="Slide Number Placeholder 6">
-            <a:extLst>
-              <a:ext uri="{FF2B5EF4-FFF2-40B4-BE49-F238E27FC236}">
-                <a16:creationId xmlns:a16="http://schemas.microsoft.com/office/drawing/2014/main" id="{27152693-3218-EBCD-F6C8-BBB35ADEA3CF}"/>
-              </a:ext>
-            </a:extLst>
-          </p:cNvPr>
+          <p:cNvPr id="7" name="Slide Number Placeholder 6"/>
           <p:cNvSpPr>
             <a:spLocks noGrp="1"/>
           </p:cNvSpPr>
@@ -2461,7 +2149,7 @@
     </p:spTree>
     <p:extLst>
       <p:ext uri="{BB962C8B-B14F-4D97-AF65-F5344CB8AC3E}">
-        <p14:creationId xmlns:p14="http://schemas.microsoft.com/office/powerpoint/2010/main" val="1385598627"/>
+        <p14:creationId xmlns:p14="http://schemas.microsoft.com/office/powerpoint/2010/main" val="1593197391"/>
       </p:ext>
     </p:extLst>
   </p:cSld>
@@ -2490,13 +2178,7 @@
       </p:grpSpPr>
       <p:sp>
         <p:nvSpPr>
-          <p:cNvPr id="2" name="Title 1">
-            <a:extLst>
-              <a:ext uri="{FF2B5EF4-FFF2-40B4-BE49-F238E27FC236}">
-                <a16:creationId xmlns:a16="http://schemas.microsoft.com/office/drawing/2014/main" id="{51B1BA76-BB65-233B-615B-EC2C8340C645}"/>
-              </a:ext>
-            </a:extLst>
-          </p:cNvPr>
+          <p:cNvPr id="2" name="Title 1"/>
           <p:cNvSpPr>
             <a:spLocks noGrp="1"/>
           </p:cNvSpPr>
@@ -2506,15 +2188,15 @@
         </p:nvSpPr>
         <p:spPr>
           <a:xfrm>
-            <a:off x="839788" y="457200"/>
-            <a:ext cx="3932237" cy="1600200"/>
+            <a:off x="719069" y="120015"/>
+            <a:ext cx="3366978" cy="420053"/>
           </a:xfrm>
         </p:spPr>
         <p:txBody>
           <a:bodyPr anchor="b"/>
           <a:lstStyle>
             <a:lvl1pPr>
-              <a:defRPr sz="3200"/>
+              <a:defRPr sz="840"/>
             </a:lvl1pPr>
           </a:lstStyle>
           <a:p>
@@ -2522,21 +2204,15 @@
               <a:rPr lang="en-US"/>
               <a:t>Click to edit Master title style</a:t>
             </a:r>
-            <a:endParaRPr lang="en-GB"/>
-          </a:p>
-        </p:txBody>
-      </p:sp>
-      <p:sp>
-        <p:nvSpPr>
-          <p:cNvPr id="3" name="Picture Placeholder 2">
-            <a:extLst>
-              <a:ext uri="{FF2B5EF4-FFF2-40B4-BE49-F238E27FC236}">
-                <a16:creationId xmlns:a16="http://schemas.microsoft.com/office/drawing/2014/main" id="{035030AC-3D9E-8DD7-3603-AC967513AFEB}"/>
-              </a:ext>
-            </a:extLst>
-          </p:cNvPr>
-          <p:cNvSpPr>
-            <a:spLocks noGrp="1"/>
+            <a:endParaRPr lang="en-US" dirty="0"/>
+          </a:p>
+        </p:txBody>
+      </p:sp>
+      <p:sp>
+        <p:nvSpPr>
+          <p:cNvPr id="3" name="Picture Placeholder 2"/>
+          <p:cNvSpPr>
+            <a:spLocks noGrp="1" noChangeAspect="1"/>
           </p:cNvSpPr>
           <p:nvPr>
             <p:ph type="pic" idx="1"/>
@@ -2544,64 +2220,62 @@
         </p:nvSpPr>
         <p:spPr>
           <a:xfrm>
-            <a:off x="5183188" y="987425"/>
-            <a:ext cx="6172200" cy="4873625"/>
+            <a:off x="4438105" y="259199"/>
+            <a:ext cx="5284946" cy="1279327"/>
           </a:xfrm>
         </p:spPr>
         <p:txBody>
-          <a:bodyPr/>
+          <a:bodyPr anchor="t"/>
           <a:lstStyle>
             <a:lvl1pPr marL="0" indent="0">
               <a:buNone/>
-              <a:defRPr sz="3200"/>
+              <a:defRPr sz="840"/>
             </a:lvl1pPr>
-            <a:lvl2pPr marL="457200" indent="0">
-              <a:buNone/>
-              <a:defRPr sz="2800"/>
+            <a:lvl2pPr marL="120015" indent="0">
+              <a:buNone/>
+              <a:defRPr sz="735"/>
             </a:lvl2pPr>
-            <a:lvl3pPr marL="914400" indent="0">
-              <a:buNone/>
-              <a:defRPr sz="2400"/>
+            <a:lvl3pPr marL="240030" indent="0">
+              <a:buNone/>
+              <a:defRPr sz="630"/>
             </a:lvl3pPr>
-            <a:lvl4pPr marL="1371600" indent="0">
-              <a:buNone/>
-              <a:defRPr sz="2000"/>
+            <a:lvl4pPr marL="360045" indent="0">
+              <a:buNone/>
+              <a:defRPr sz="525"/>
             </a:lvl4pPr>
-            <a:lvl5pPr marL="1828800" indent="0">
-              <a:buNone/>
-              <a:defRPr sz="2000"/>
+            <a:lvl5pPr marL="480060" indent="0">
+              <a:buNone/>
+              <a:defRPr sz="525"/>
             </a:lvl5pPr>
-            <a:lvl6pPr marL="2286000" indent="0">
-              <a:buNone/>
-              <a:defRPr sz="2000"/>
+            <a:lvl6pPr marL="600075" indent="0">
+              <a:buNone/>
+              <a:defRPr sz="525"/>
             </a:lvl6pPr>
-            <a:lvl7pPr marL="2743200" indent="0">
-              <a:buNone/>
-              <a:defRPr sz="2000"/>
+            <a:lvl7pPr marL="720090" indent="0">
+              <a:buNone/>
+              <a:defRPr sz="525"/>
             </a:lvl7pPr>
-            <a:lvl8pPr marL="3200400" indent="0">
-              <a:buNone/>
-              <a:defRPr sz="2000"/>
+            <a:lvl8pPr marL="840105" indent="0">
+              <a:buNone/>
+              <a:defRPr sz="525"/>
             </a:lvl8pPr>
-            <a:lvl9pPr marL="3657600" indent="0">
-              <a:buNone/>
-              <a:defRPr sz="2000"/>
+            <a:lvl9pPr marL="960120" indent="0">
+              <a:buNone/>
+              <a:defRPr sz="525"/>
             </a:lvl9pPr>
           </a:lstStyle>
           <a:p>
-            <a:endParaRPr lang="en-GB"/>
-          </a:p>
-        </p:txBody>
-      </p:sp>
-      <p:sp>
-        <p:nvSpPr>
-          <p:cNvPr id="4" name="Text Placeholder 3">
-            <a:extLst>
-              <a:ext uri="{FF2B5EF4-FFF2-40B4-BE49-F238E27FC236}">
-                <a16:creationId xmlns:a16="http://schemas.microsoft.com/office/drawing/2014/main" id="{64C1A356-A8C2-4E66-2556-A219DEEC60A2}"/>
-              </a:ext>
-            </a:extLst>
-          </p:cNvPr>
+            <a:r>
+              <a:rPr lang="en-US"/>
+              <a:t>Click icon to add picture</a:t>
+            </a:r>
+            <a:endParaRPr lang="en-US" dirty="0"/>
+          </a:p>
+        </p:txBody>
+      </p:sp>
+      <p:sp>
+        <p:nvSpPr>
+          <p:cNvPr id="4" name="Text Placeholder 3"/>
           <p:cNvSpPr>
             <a:spLocks noGrp="1"/>
           </p:cNvSpPr>
@@ -2611,8 +2285,8 @@
         </p:nvSpPr>
         <p:spPr>
           <a:xfrm>
-            <a:off x="839788" y="2057400"/>
-            <a:ext cx="3932237" cy="3811588"/>
+            <a:off x="719069" y="540067"/>
+            <a:ext cx="3366978" cy="1000542"/>
           </a:xfrm>
         </p:spPr>
         <p:txBody>
@@ -2620,39 +2294,39 @@
           <a:lstStyle>
             <a:lvl1pPr marL="0" indent="0">
               <a:buNone/>
-              <a:defRPr sz="1600"/>
+              <a:defRPr sz="420"/>
             </a:lvl1pPr>
-            <a:lvl2pPr marL="457200" indent="0">
-              <a:buNone/>
-              <a:defRPr sz="1400"/>
+            <a:lvl2pPr marL="120015" indent="0">
+              <a:buNone/>
+              <a:defRPr sz="368"/>
             </a:lvl2pPr>
-            <a:lvl3pPr marL="914400" indent="0">
-              <a:buNone/>
-              <a:defRPr sz="1200"/>
+            <a:lvl3pPr marL="240030" indent="0">
+              <a:buNone/>
+              <a:defRPr sz="315"/>
             </a:lvl3pPr>
-            <a:lvl4pPr marL="1371600" indent="0">
-              <a:buNone/>
-              <a:defRPr sz="1000"/>
+            <a:lvl4pPr marL="360045" indent="0">
+              <a:buNone/>
+              <a:defRPr sz="263"/>
             </a:lvl4pPr>
-            <a:lvl5pPr marL="1828800" indent="0">
-              <a:buNone/>
-              <a:defRPr sz="1000"/>
+            <a:lvl5pPr marL="480060" indent="0">
+              <a:buNone/>
+              <a:defRPr sz="263"/>
             </a:lvl5pPr>
-            <a:lvl6pPr marL="2286000" indent="0">
-              <a:buNone/>
-              <a:defRPr sz="1000"/>
+            <a:lvl6pPr marL="600075" indent="0">
+              <a:buNone/>
+              <a:defRPr sz="263"/>
             </a:lvl6pPr>
-            <a:lvl7pPr marL="2743200" indent="0">
-              <a:buNone/>
-              <a:defRPr sz="1000"/>
+            <a:lvl7pPr marL="720090" indent="0">
+              <a:buNone/>
+              <a:defRPr sz="263"/>
             </a:lvl7pPr>
-            <a:lvl8pPr marL="3200400" indent="0">
-              <a:buNone/>
-              <a:defRPr sz="1000"/>
+            <a:lvl8pPr marL="840105" indent="0">
+              <a:buNone/>
+              <a:defRPr sz="263"/>
             </a:lvl8pPr>
-            <a:lvl9pPr marL="3657600" indent="0">
-              <a:buNone/>
-              <a:defRPr sz="1000"/>
+            <a:lvl9pPr marL="960120" indent="0">
+              <a:buNone/>
+              <a:defRPr sz="263"/>
             </a:lvl9pPr>
           </a:lstStyle>
           <a:p>
@@ -2666,13 +2340,7 @@
       </p:sp>
       <p:sp>
         <p:nvSpPr>
-          <p:cNvPr id="5" name="Date Placeholder 4">
-            <a:extLst>
-              <a:ext uri="{FF2B5EF4-FFF2-40B4-BE49-F238E27FC236}">
-                <a16:creationId xmlns:a16="http://schemas.microsoft.com/office/drawing/2014/main" id="{215B12C6-95D0-18EE-FA46-29A43F02C45A}"/>
-              </a:ext>
-            </a:extLst>
-          </p:cNvPr>
+          <p:cNvPr id="5" name="Date Placeholder 4"/>
           <p:cNvSpPr>
             <a:spLocks noGrp="1"/>
           </p:cNvSpPr>
@@ -2687,7 +2355,7 @@
           <a:p>
             <a:fld id="{15D4EB86-B9EA-4611-8686-4A88DEA7CEA4}" type="datetimeFigureOut">
               <a:rPr lang="en-GB" smtClean="0"/>
-              <a:t>03/05/2022</a:t>
+              <a:t>09/05/2022</a:t>
             </a:fld>
             <a:endParaRPr lang="en-GB"/>
           </a:p>
@@ -2695,13 +2363,7 @@
       </p:sp>
       <p:sp>
         <p:nvSpPr>
-          <p:cNvPr id="6" name="Footer Placeholder 5">
-            <a:extLst>
-              <a:ext uri="{FF2B5EF4-FFF2-40B4-BE49-F238E27FC236}">
-                <a16:creationId xmlns:a16="http://schemas.microsoft.com/office/drawing/2014/main" id="{27A46949-2508-5925-A2B3-12BBB7C36A24}"/>
-              </a:ext>
-            </a:extLst>
-          </p:cNvPr>
+          <p:cNvPr id="6" name="Footer Placeholder 5"/>
           <p:cNvSpPr>
             <a:spLocks noGrp="1"/>
           </p:cNvSpPr>
@@ -2720,13 +2382,7 @@
       </p:sp>
       <p:sp>
         <p:nvSpPr>
-          <p:cNvPr id="7" name="Slide Number Placeholder 6">
-            <a:extLst>
-              <a:ext uri="{FF2B5EF4-FFF2-40B4-BE49-F238E27FC236}">
-                <a16:creationId xmlns:a16="http://schemas.microsoft.com/office/drawing/2014/main" id="{82A490A0-7911-C3FB-4983-8F3B613770E4}"/>
-              </a:ext>
-            </a:extLst>
-          </p:cNvPr>
+          <p:cNvPr id="7" name="Slide Number Placeholder 6"/>
           <p:cNvSpPr>
             <a:spLocks noGrp="1"/>
           </p:cNvSpPr>
@@ -2750,7 +2406,7 @@
     </p:spTree>
     <p:extLst>
       <p:ext uri="{BB962C8B-B14F-4D97-AF65-F5344CB8AC3E}">
-        <p14:creationId xmlns:p14="http://schemas.microsoft.com/office/powerpoint/2010/main" val="3209664693"/>
+        <p14:creationId xmlns:p14="http://schemas.microsoft.com/office/powerpoint/2010/main" val="2906585266"/>
       </p:ext>
     </p:extLst>
   </p:cSld>
@@ -2784,13 +2440,7 @@
       </p:grpSpPr>
       <p:sp>
         <p:nvSpPr>
-          <p:cNvPr id="2" name="Title Placeholder 1">
-            <a:extLst>
-              <a:ext uri="{FF2B5EF4-FFF2-40B4-BE49-F238E27FC236}">
-                <a16:creationId xmlns:a16="http://schemas.microsoft.com/office/drawing/2014/main" id="{2699F123-F1A4-5A96-7DAC-A94242963A5D}"/>
-              </a:ext>
-            </a:extLst>
-          </p:cNvPr>
+          <p:cNvPr id="2" name="Title Placeholder 1"/>
           <p:cNvSpPr>
             <a:spLocks noGrp="1"/>
           </p:cNvSpPr>
@@ -2800,8 +2450,8 @@
         </p:nvSpPr>
         <p:spPr>
           <a:xfrm>
-            <a:off x="838200" y="365125"/>
-            <a:ext cx="10515600" cy="1325563"/>
+            <a:off x="717709" y="95846"/>
+            <a:ext cx="9003983" cy="347960"/>
           </a:xfrm>
           <a:prstGeom prst="rect">
             <a:avLst/>
@@ -2817,19 +2467,13 @@
               <a:rPr lang="en-US"/>
               <a:t>Click to edit Master title style</a:t>
             </a:r>
-            <a:endParaRPr lang="en-GB"/>
-          </a:p>
-        </p:txBody>
-      </p:sp>
-      <p:sp>
-        <p:nvSpPr>
-          <p:cNvPr id="3" name="Text Placeholder 2">
-            <a:extLst>
-              <a:ext uri="{FF2B5EF4-FFF2-40B4-BE49-F238E27FC236}">
-                <a16:creationId xmlns:a16="http://schemas.microsoft.com/office/drawing/2014/main" id="{F7943836-48D0-6D15-A6AE-2F34A9B2632B}"/>
-              </a:ext>
-            </a:extLst>
-          </p:cNvPr>
+            <a:endParaRPr lang="en-US" dirty="0"/>
+          </a:p>
+        </p:txBody>
+      </p:sp>
+      <p:sp>
+        <p:nvSpPr>
+          <p:cNvPr id="3" name="Text Placeholder 2"/>
           <p:cNvSpPr>
             <a:spLocks noGrp="1"/>
           </p:cNvSpPr>
@@ -2839,8 +2483,8 @@
         </p:nvSpPr>
         <p:spPr>
           <a:xfrm>
-            <a:off x="838200" y="1825625"/>
-            <a:ext cx="10515600" cy="4351338"/>
+            <a:off x="717709" y="479227"/>
+            <a:ext cx="9003983" cy="1142226"/>
           </a:xfrm>
           <a:prstGeom prst="rect">
             <a:avLst/>
@@ -2885,19 +2529,13 @@
               <a:rPr lang="en-US"/>
               <a:t>Fifth level</a:t>
             </a:r>
-            <a:endParaRPr lang="en-GB"/>
-          </a:p>
-        </p:txBody>
-      </p:sp>
-      <p:sp>
-        <p:nvSpPr>
-          <p:cNvPr id="4" name="Date Placeholder 3">
-            <a:extLst>
-              <a:ext uri="{FF2B5EF4-FFF2-40B4-BE49-F238E27FC236}">
-                <a16:creationId xmlns:a16="http://schemas.microsoft.com/office/drawing/2014/main" id="{2187A194-2323-5215-3131-7AFC83B77F85}"/>
-              </a:ext>
-            </a:extLst>
-          </p:cNvPr>
+            <a:endParaRPr lang="en-US" dirty="0"/>
+          </a:p>
+        </p:txBody>
+      </p:sp>
+      <p:sp>
+        <p:nvSpPr>
+          <p:cNvPr id="4" name="Date Placeholder 3"/>
           <p:cNvSpPr>
             <a:spLocks noGrp="1"/>
           </p:cNvSpPr>
@@ -2907,8 +2545,8 @@
         </p:nvSpPr>
         <p:spPr>
           <a:xfrm>
-            <a:off x="838200" y="6356350"/>
-            <a:ext cx="2743200" cy="365125"/>
+            <a:off x="717709" y="1668542"/>
+            <a:ext cx="2348865" cy="95845"/>
           </a:xfrm>
           <a:prstGeom prst="rect">
             <a:avLst/>
@@ -2918,7 +2556,7 @@
           <a:bodyPr vert="horz" lIns="91440" tIns="45720" rIns="91440" bIns="45720" rtlCol="0" anchor="ctr"/>
           <a:lstStyle>
             <a:lvl1pPr algn="l">
-              <a:defRPr sz="1200">
+              <a:defRPr sz="315">
                 <a:solidFill>
                   <a:schemeClr val="tx1">
                     <a:tint val="75000"/>
@@ -2930,7 +2568,7 @@
           <a:p>
             <a:fld id="{15D4EB86-B9EA-4611-8686-4A88DEA7CEA4}" type="datetimeFigureOut">
               <a:rPr lang="en-GB" smtClean="0"/>
-              <a:t>03/05/2022</a:t>
+              <a:t>09/05/2022</a:t>
             </a:fld>
             <a:endParaRPr lang="en-GB"/>
           </a:p>
@@ -2938,13 +2576,7 @@
       </p:sp>
       <p:sp>
         <p:nvSpPr>
-          <p:cNvPr id="5" name="Footer Placeholder 4">
-            <a:extLst>
-              <a:ext uri="{FF2B5EF4-FFF2-40B4-BE49-F238E27FC236}">
-                <a16:creationId xmlns:a16="http://schemas.microsoft.com/office/drawing/2014/main" id="{37C57B61-D6E9-381E-18BA-327A9D9E4FCC}"/>
-              </a:ext>
-            </a:extLst>
-          </p:cNvPr>
+          <p:cNvPr id="5" name="Footer Placeholder 4"/>
           <p:cNvSpPr>
             <a:spLocks noGrp="1"/>
           </p:cNvSpPr>
@@ -2954,8 +2586,8 @@
         </p:nvSpPr>
         <p:spPr>
           <a:xfrm>
-            <a:off x="4038600" y="6356350"/>
-            <a:ext cx="4114800" cy="365125"/>
+            <a:off x="3458051" y="1668542"/>
+            <a:ext cx="3523298" cy="95845"/>
           </a:xfrm>
           <a:prstGeom prst="rect">
             <a:avLst/>
@@ -2965,7 +2597,7 @@
           <a:bodyPr vert="horz" lIns="91440" tIns="45720" rIns="91440" bIns="45720" rtlCol="0" anchor="ctr"/>
           <a:lstStyle>
             <a:lvl1pPr algn="ctr">
-              <a:defRPr sz="1200">
+              <a:defRPr sz="315">
                 <a:solidFill>
                   <a:schemeClr val="tx1">
                     <a:tint val="75000"/>
@@ -2981,13 +2613,7 @@
       </p:sp>
       <p:sp>
         <p:nvSpPr>
-          <p:cNvPr id="6" name="Slide Number Placeholder 5">
-            <a:extLst>
-              <a:ext uri="{FF2B5EF4-FFF2-40B4-BE49-F238E27FC236}">
-                <a16:creationId xmlns:a16="http://schemas.microsoft.com/office/drawing/2014/main" id="{EC394374-1320-D18B-E3CB-6E8113E99B3D}"/>
-              </a:ext>
-            </a:extLst>
-          </p:cNvPr>
+          <p:cNvPr id="6" name="Slide Number Placeholder 5"/>
           <p:cNvSpPr>
             <a:spLocks noGrp="1"/>
           </p:cNvSpPr>
@@ -2997,8 +2623,8 @@
         </p:nvSpPr>
         <p:spPr>
           <a:xfrm>
-            <a:off x="8610600" y="6356350"/>
-            <a:ext cx="2743200" cy="365125"/>
+            <a:off x="7372826" y="1668542"/>
+            <a:ext cx="2348865" cy="95845"/>
           </a:xfrm>
           <a:prstGeom prst="rect">
             <a:avLst/>
@@ -3008,7 +2634,7 @@
           <a:bodyPr vert="horz" lIns="91440" tIns="45720" rIns="91440" bIns="45720" rtlCol="0" anchor="ctr"/>
           <a:lstStyle>
             <a:lvl1pPr algn="r">
-              <a:defRPr sz="1200">
+              <a:defRPr sz="315">
                 <a:solidFill>
                   <a:schemeClr val="tx1">
                     <a:tint val="75000"/>
@@ -3029,27 +2655,27 @@
     </p:spTree>
     <p:extLst>
       <p:ext uri="{BB962C8B-B14F-4D97-AF65-F5344CB8AC3E}">
-        <p14:creationId xmlns:p14="http://schemas.microsoft.com/office/powerpoint/2010/main" val="2564475684"/>
+        <p14:creationId xmlns:p14="http://schemas.microsoft.com/office/powerpoint/2010/main" val="3603797820"/>
       </p:ext>
     </p:extLst>
   </p:cSld>
   <p:clrMap bg1="lt1" tx1="dk1" bg2="lt2" tx2="dk2" accent1="accent1" accent2="accent2" accent3="accent3" accent4="accent4" accent5="accent5" accent6="accent6" hlink="hlink" folHlink="folHlink"/>
   <p:sldLayoutIdLst>
-    <p:sldLayoutId id="2147483649" r:id="rId1"/>
-    <p:sldLayoutId id="2147483650" r:id="rId2"/>
-    <p:sldLayoutId id="2147483651" r:id="rId3"/>
-    <p:sldLayoutId id="2147483652" r:id="rId4"/>
-    <p:sldLayoutId id="2147483653" r:id="rId5"/>
-    <p:sldLayoutId id="2147483654" r:id="rId6"/>
-    <p:sldLayoutId id="2147483655" r:id="rId7"/>
-    <p:sldLayoutId id="2147483656" r:id="rId8"/>
-    <p:sldLayoutId id="2147483657" r:id="rId9"/>
-    <p:sldLayoutId id="2147483658" r:id="rId10"/>
-    <p:sldLayoutId id="2147483659" r:id="rId11"/>
+    <p:sldLayoutId id="2147483709" r:id="rId1"/>
+    <p:sldLayoutId id="2147483710" r:id="rId2"/>
+    <p:sldLayoutId id="2147483711" r:id="rId3"/>
+    <p:sldLayoutId id="2147483712" r:id="rId4"/>
+    <p:sldLayoutId id="2147483713" r:id="rId5"/>
+    <p:sldLayoutId id="2147483714" r:id="rId6"/>
+    <p:sldLayoutId id="2147483715" r:id="rId7"/>
+    <p:sldLayoutId id="2147483716" r:id="rId8"/>
+    <p:sldLayoutId id="2147483717" r:id="rId9"/>
+    <p:sldLayoutId id="2147483718" r:id="rId10"/>
+    <p:sldLayoutId id="2147483719" r:id="rId11"/>
   </p:sldLayoutIdLst>
   <p:txStyles>
     <p:titleStyle>
-      <a:lvl1pPr algn="l" defTabSz="914400" rtl="0" eaLnBrk="1" latinLnBrk="0" hangingPunct="1">
+      <a:lvl1pPr algn="l" defTabSz="240030" rtl="0" eaLnBrk="1" latinLnBrk="0" hangingPunct="1">
         <a:lnSpc>
           <a:spcPct val="90000"/>
         </a:lnSpc>
@@ -3057,7 +2683,7 @@
           <a:spcPct val="0"/>
         </a:spcBef>
         <a:buNone/>
-        <a:defRPr sz="4400" kern="1200">
+        <a:defRPr sz="1155" kern="1200">
           <a:solidFill>
             <a:schemeClr val="tx1"/>
           </a:solidFill>
@@ -3068,16 +2694,16 @@
       </a:lvl1pPr>
     </p:titleStyle>
     <p:bodyStyle>
-      <a:lvl1pPr marL="228600" indent="-228600" algn="l" defTabSz="914400" rtl="0" eaLnBrk="1" latinLnBrk="0" hangingPunct="1">
+      <a:lvl1pPr marL="60008" indent="-60008" algn="l" defTabSz="240030" rtl="0" eaLnBrk="1" latinLnBrk="0" hangingPunct="1">
         <a:lnSpc>
           <a:spcPct val="90000"/>
         </a:lnSpc>
         <a:spcBef>
-          <a:spcPts val="1000"/>
+          <a:spcPts val="263"/>
         </a:spcBef>
         <a:buFont typeface="Arial" panose="020B0604020202020204" pitchFamily="34" charset="0"/>
         <a:buChar char="•"/>
-        <a:defRPr sz="2800" kern="1200">
+        <a:defRPr sz="735" kern="1200">
           <a:solidFill>
             <a:schemeClr val="tx1"/>
           </a:solidFill>
@@ -3086,16 +2712,16 @@
           <a:cs typeface="+mn-cs"/>
         </a:defRPr>
       </a:lvl1pPr>
-      <a:lvl2pPr marL="685800" indent="-228600" algn="l" defTabSz="914400" rtl="0" eaLnBrk="1" latinLnBrk="0" hangingPunct="1">
+      <a:lvl2pPr marL="180023" indent="-60008" algn="l" defTabSz="240030" rtl="0" eaLnBrk="1" latinLnBrk="0" hangingPunct="1">
         <a:lnSpc>
           <a:spcPct val="90000"/>
         </a:lnSpc>
         <a:spcBef>
-          <a:spcPts val="500"/>
+          <a:spcPts val="131"/>
         </a:spcBef>
         <a:buFont typeface="Arial" panose="020B0604020202020204" pitchFamily="34" charset="0"/>
         <a:buChar char="•"/>
-        <a:defRPr sz="2400" kern="1200">
+        <a:defRPr sz="630" kern="1200">
           <a:solidFill>
             <a:schemeClr val="tx1"/>
           </a:solidFill>
@@ -3104,16 +2730,16 @@
           <a:cs typeface="+mn-cs"/>
         </a:defRPr>
       </a:lvl2pPr>
-      <a:lvl3pPr marL="1143000" indent="-228600" algn="l" defTabSz="914400" rtl="0" eaLnBrk="1" latinLnBrk="0" hangingPunct="1">
+      <a:lvl3pPr marL="300038" indent="-60008" algn="l" defTabSz="240030" rtl="0" eaLnBrk="1" latinLnBrk="0" hangingPunct="1">
         <a:lnSpc>
           <a:spcPct val="90000"/>
         </a:lnSpc>
         <a:spcBef>
-          <a:spcPts val="500"/>
+          <a:spcPts val="131"/>
         </a:spcBef>
         <a:buFont typeface="Arial" panose="020B0604020202020204" pitchFamily="34" charset="0"/>
         <a:buChar char="•"/>
-        <a:defRPr sz="2000" kern="1200">
+        <a:defRPr sz="525" kern="1200">
           <a:solidFill>
             <a:schemeClr val="tx1"/>
           </a:solidFill>
@@ -3122,16 +2748,16 @@
           <a:cs typeface="+mn-cs"/>
         </a:defRPr>
       </a:lvl3pPr>
-      <a:lvl4pPr marL="1600200" indent="-228600" algn="l" defTabSz="914400" rtl="0" eaLnBrk="1" latinLnBrk="0" hangingPunct="1">
+      <a:lvl4pPr marL="420053" indent="-60008" algn="l" defTabSz="240030" rtl="0" eaLnBrk="1" latinLnBrk="0" hangingPunct="1">
         <a:lnSpc>
           <a:spcPct val="90000"/>
         </a:lnSpc>
         <a:spcBef>
-          <a:spcPts val="500"/>
+          <a:spcPts val="131"/>
         </a:spcBef>
         <a:buFont typeface="Arial" panose="020B0604020202020204" pitchFamily="34" charset="0"/>
         <a:buChar char="•"/>
-        <a:defRPr sz="1800" kern="1200">
+        <a:defRPr sz="472" kern="1200">
           <a:solidFill>
             <a:schemeClr val="tx1"/>
           </a:solidFill>
@@ -3140,16 +2766,16 @@
           <a:cs typeface="+mn-cs"/>
         </a:defRPr>
       </a:lvl4pPr>
-      <a:lvl5pPr marL="2057400" indent="-228600" algn="l" defTabSz="914400" rtl="0" eaLnBrk="1" latinLnBrk="0" hangingPunct="1">
+      <a:lvl5pPr marL="540068" indent="-60008" algn="l" defTabSz="240030" rtl="0" eaLnBrk="1" latinLnBrk="0" hangingPunct="1">
         <a:lnSpc>
           <a:spcPct val="90000"/>
         </a:lnSpc>
         <a:spcBef>
-          <a:spcPts val="500"/>
+          <a:spcPts val="131"/>
         </a:spcBef>
         <a:buFont typeface="Arial" panose="020B0604020202020204" pitchFamily="34" charset="0"/>
         <a:buChar char="•"/>
-        <a:defRPr sz="1800" kern="1200">
+        <a:defRPr sz="472" kern="1200">
           <a:solidFill>
             <a:schemeClr val="tx1"/>
           </a:solidFill>
@@ -3158,16 +2784,16 @@
           <a:cs typeface="+mn-cs"/>
         </a:defRPr>
       </a:lvl5pPr>
-      <a:lvl6pPr marL="2514600" indent="-228600" algn="l" defTabSz="914400" rtl="0" eaLnBrk="1" latinLnBrk="0" hangingPunct="1">
+      <a:lvl6pPr marL="660083" indent="-60008" algn="l" defTabSz="240030" rtl="0" eaLnBrk="1" latinLnBrk="0" hangingPunct="1">
         <a:lnSpc>
           <a:spcPct val="90000"/>
         </a:lnSpc>
         <a:spcBef>
-          <a:spcPts val="500"/>
+          <a:spcPts val="131"/>
         </a:spcBef>
         <a:buFont typeface="Arial" panose="020B0604020202020204" pitchFamily="34" charset="0"/>
         <a:buChar char="•"/>
-        <a:defRPr sz="1800" kern="1200">
+        <a:defRPr sz="472" kern="1200">
           <a:solidFill>
             <a:schemeClr val="tx1"/>
           </a:solidFill>
@@ -3176,16 +2802,16 @@
           <a:cs typeface="+mn-cs"/>
         </a:defRPr>
       </a:lvl6pPr>
-      <a:lvl7pPr marL="2971800" indent="-228600" algn="l" defTabSz="914400" rtl="0" eaLnBrk="1" latinLnBrk="0" hangingPunct="1">
+      <a:lvl7pPr marL="780098" indent="-60008" algn="l" defTabSz="240030" rtl="0" eaLnBrk="1" latinLnBrk="0" hangingPunct="1">
         <a:lnSpc>
           <a:spcPct val="90000"/>
         </a:lnSpc>
         <a:spcBef>
-          <a:spcPts val="500"/>
+          <a:spcPts val="131"/>
         </a:spcBef>
         <a:buFont typeface="Arial" panose="020B0604020202020204" pitchFamily="34" charset="0"/>
         <a:buChar char="•"/>
-        <a:defRPr sz="1800" kern="1200">
+        <a:defRPr sz="472" kern="1200">
           <a:solidFill>
             <a:schemeClr val="tx1"/>
           </a:solidFill>
@@ -3194,16 +2820,16 @@
           <a:cs typeface="+mn-cs"/>
         </a:defRPr>
       </a:lvl7pPr>
-      <a:lvl8pPr marL="3429000" indent="-228600" algn="l" defTabSz="914400" rtl="0" eaLnBrk="1" latinLnBrk="0" hangingPunct="1">
+      <a:lvl8pPr marL="900113" indent="-60008" algn="l" defTabSz="240030" rtl="0" eaLnBrk="1" latinLnBrk="0" hangingPunct="1">
         <a:lnSpc>
           <a:spcPct val="90000"/>
         </a:lnSpc>
         <a:spcBef>
-          <a:spcPts val="500"/>
+          <a:spcPts val="131"/>
         </a:spcBef>
         <a:buFont typeface="Arial" panose="020B0604020202020204" pitchFamily="34" charset="0"/>
         <a:buChar char="•"/>
-        <a:defRPr sz="1800" kern="1200">
+        <a:defRPr sz="472" kern="1200">
           <a:solidFill>
             <a:schemeClr val="tx1"/>
           </a:solidFill>
@@ -3212,16 +2838,16 @@
           <a:cs typeface="+mn-cs"/>
         </a:defRPr>
       </a:lvl8pPr>
-      <a:lvl9pPr marL="3886200" indent="-228600" algn="l" defTabSz="914400" rtl="0" eaLnBrk="1" latinLnBrk="0" hangingPunct="1">
+      <a:lvl9pPr marL="1020128" indent="-60008" algn="l" defTabSz="240030" rtl="0" eaLnBrk="1" latinLnBrk="0" hangingPunct="1">
         <a:lnSpc>
           <a:spcPct val="90000"/>
         </a:lnSpc>
         <a:spcBef>
-          <a:spcPts val="500"/>
+          <a:spcPts val="131"/>
         </a:spcBef>
         <a:buFont typeface="Arial" panose="020B0604020202020204" pitchFamily="34" charset="0"/>
         <a:buChar char="•"/>
-        <a:defRPr sz="1800" kern="1200">
+        <a:defRPr sz="472" kern="1200">
           <a:solidFill>
             <a:schemeClr val="tx1"/>
           </a:solidFill>
@@ -3235,8 +2861,8 @@
       <a:defPPr>
         <a:defRPr lang="en-US"/>
       </a:defPPr>
-      <a:lvl1pPr marL="0" algn="l" defTabSz="914400" rtl="0" eaLnBrk="1" latinLnBrk="0" hangingPunct="1">
-        <a:defRPr sz="1800" kern="1200">
+      <a:lvl1pPr marL="0" algn="l" defTabSz="240030" rtl="0" eaLnBrk="1" latinLnBrk="0" hangingPunct="1">
+        <a:defRPr sz="472" kern="1200">
           <a:solidFill>
             <a:schemeClr val="tx1"/>
           </a:solidFill>
@@ -3245,8 +2871,8 @@
           <a:cs typeface="+mn-cs"/>
         </a:defRPr>
       </a:lvl1pPr>
-      <a:lvl2pPr marL="457200" algn="l" defTabSz="914400" rtl="0" eaLnBrk="1" latinLnBrk="0" hangingPunct="1">
-        <a:defRPr sz="1800" kern="1200">
+      <a:lvl2pPr marL="120015" algn="l" defTabSz="240030" rtl="0" eaLnBrk="1" latinLnBrk="0" hangingPunct="1">
+        <a:defRPr sz="472" kern="1200">
           <a:solidFill>
             <a:schemeClr val="tx1"/>
           </a:solidFill>
@@ -3255,8 +2881,8 @@
           <a:cs typeface="+mn-cs"/>
         </a:defRPr>
       </a:lvl2pPr>
-      <a:lvl3pPr marL="914400" algn="l" defTabSz="914400" rtl="0" eaLnBrk="1" latinLnBrk="0" hangingPunct="1">
-        <a:defRPr sz="1800" kern="1200">
+      <a:lvl3pPr marL="240030" algn="l" defTabSz="240030" rtl="0" eaLnBrk="1" latinLnBrk="0" hangingPunct="1">
+        <a:defRPr sz="472" kern="1200">
           <a:solidFill>
             <a:schemeClr val="tx1"/>
           </a:solidFill>
@@ -3265,8 +2891,8 @@
           <a:cs typeface="+mn-cs"/>
         </a:defRPr>
       </a:lvl3pPr>
-      <a:lvl4pPr marL="1371600" algn="l" defTabSz="914400" rtl="0" eaLnBrk="1" latinLnBrk="0" hangingPunct="1">
-        <a:defRPr sz="1800" kern="1200">
+      <a:lvl4pPr marL="360045" algn="l" defTabSz="240030" rtl="0" eaLnBrk="1" latinLnBrk="0" hangingPunct="1">
+        <a:defRPr sz="472" kern="1200">
           <a:solidFill>
             <a:schemeClr val="tx1"/>
           </a:solidFill>
@@ -3275,8 +2901,8 @@
           <a:cs typeface="+mn-cs"/>
         </a:defRPr>
       </a:lvl4pPr>
-      <a:lvl5pPr marL="1828800" algn="l" defTabSz="914400" rtl="0" eaLnBrk="1" latinLnBrk="0" hangingPunct="1">
-        <a:defRPr sz="1800" kern="1200">
+      <a:lvl5pPr marL="480060" algn="l" defTabSz="240030" rtl="0" eaLnBrk="1" latinLnBrk="0" hangingPunct="1">
+        <a:defRPr sz="472" kern="1200">
           <a:solidFill>
             <a:schemeClr val="tx1"/>
           </a:solidFill>
@@ -3285,8 +2911,8 @@
           <a:cs typeface="+mn-cs"/>
         </a:defRPr>
       </a:lvl5pPr>
-      <a:lvl6pPr marL="2286000" algn="l" defTabSz="914400" rtl="0" eaLnBrk="1" latinLnBrk="0" hangingPunct="1">
-        <a:defRPr sz="1800" kern="1200">
+      <a:lvl6pPr marL="600075" algn="l" defTabSz="240030" rtl="0" eaLnBrk="1" latinLnBrk="0" hangingPunct="1">
+        <a:defRPr sz="472" kern="1200">
           <a:solidFill>
             <a:schemeClr val="tx1"/>
           </a:solidFill>
@@ -3295,8 +2921,8 @@
           <a:cs typeface="+mn-cs"/>
         </a:defRPr>
       </a:lvl6pPr>
-      <a:lvl7pPr marL="2743200" algn="l" defTabSz="914400" rtl="0" eaLnBrk="1" latinLnBrk="0" hangingPunct="1">
-        <a:defRPr sz="1800" kern="1200">
+      <a:lvl7pPr marL="720090" algn="l" defTabSz="240030" rtl="0" eaLnBrk="1" latinLnBrk="0" hangingPunct="1">
+        <a:defRPr sz="472" kern="1200">
           <a:solidFill>
             <a:schemeClr val="tx1"/>
           </a:solidFill>
@@ -3305,8 +2931,8 @@
           <a:cs typeface="+mn-cs"/>
         </a:defRPr>
       </a:lvl7pPr>
-      <a:lvl8pPr marL="3200400" algn="l" defTabSz="914400" rtl="0" eaLnBrk="1" latinLnBrk="0" hangingPunct="1">
-        <a:defRPr sz="1800" kern="1200">
+      <a:lvl8pPr marL="840105" algn="l" defTabSz="240030" rtl="0" eaLnBrk="1" latinLnBrk="0" hangingPunct="1">
+        <a:defRPr sz="472" kern="1200">
           <a:solidFill>
             <a:schemeClr val="tx1"/>
           </a:solidFill>
@@ -3315,8 +2941,8 @@
           <a:cs typeface="+mn-cs"/>
         </a:defRPr>
       </a:lvl8pPr>
-      <a:lvl9pPr marL="3657600" algn="l" defTabSz="914400" rtl="0" eaLnBrk="1" latinLnBrk="0" hangingPunct="1">
-        <a:defRPr sz="1800" kern="1200">
+      <a:lvl9pPr marL="960120" algn="l" defTabSz="240030" rtl="0" eaLnBrk="1" latinLnBrk="0" hangingPunct="1">
+        <a:defRPr sz="472" kern="1200">
           <a:solidFill>
             <a:schemeClr val="tx1"/>
           </a:solidFill>
@@ -3361,7 +2987,7 @@
         </p:nvGrpSpPr>
         <p:grpSpPr>
           <a:xfrm>
-            <a:off x="1402672" y="1995398"/>
+            <a:off x="526372" y="229848"/>
             <a:ext cx="9561250" cy="1340528"/>
             <a:chOff x="1402672" y="1995398"/>
             <a:chExt cx="9561250" cy="1340528"/>
@@ -3421,7 +3047,7 @@
                     <a:schemeClr val="tx1"/>
                   </a:solidFill>
                 </a:rPr>
-                <a:t>1</a:t>
+                <a:t>0</a:t>
               </a:r>
             </a:p>
           </p:txBody>
@@ -3480,7 +3106,7 @@
                     <a:schemeClr val="tx1"/>
                   </a:solidFill>
                 </a:rPr>
-                <a:t>2</a:t>
+                <a:t>1</a:t>
               </a:r>
             </a:p>
           </p:txBody>
@@ -3539,7 +3165,7 @@
                     <a:schemeClr val="tx1"/>
                   </a:solidFill>
                 </a:rPr>
-                <a:t>3</a:t>
+                <a:t>2</a:t>
               </a:r>
             </a:p>
           </p:txBody>
@@ -3882,105 +3508,87 @@
             <a:lstStyle/>
             <a:p>
               <a:pPr algn="ctr"/>
-              <a:endParaRPr lang="en-GB"/>
-            </a:p>
-          </p:txBody>
-        </p:sp>
-        <p:sp>
-          <p:nvSpPr>
-            <p:cNvPr id="2" name="Arrow: Right 1">
-              <a:extLst>
-                <a:ext uri="{FF2B5EF4-FFF2-40B4-BE49-F238E27FC236}">
-                  <a16:creationId xmlns:a16="http://schemas.microsoft.com/office/drawing/2014/main" id="{0171AA44-3D08-3BD6-195B-9BD8B8055E06}"/>
-                </a:ext>
-              </a:extLst>
-            </p:cNvPr>
-            <p:cNvSpPr/>
-            <p:nvPr/>
-          </p:nvSpPr>
-          <p:spPr>
-            <a:xfrm>
-              <a:off x="4315657" y="2513397"/>
-              <a:ext cx="676923" cy="335298"/>
-            </a:xfrm>
-            <a:prstGeom prst="rightArrow">
-              <a:avLst/>
-            </a:prstGeom>
-            <a:noFill/>
-          </p:spPr>
-          <p:style>
-            <a:lnRef idx="2">
-              <a:schemeClr val="accent1">
-                <a:shade val="50000"/>
-              </a:schemeClr>
-            </a:lnRef>
-            <a:fillRef idx="1">
-              <a:schemeClr val="accent1"/>
-            </a:fillRef>
-            <a:effectRef idx="0">
-              <a:schemeClr val="accent1"/>
-            </a:effectRef>
-            <a:fontRef idx="minor">
-              <a:schemeClr val="lt1"/>
-            </a:fontRef>
-          </p:style>
-          <p:txBody>
-            <a:bodyPr rtlCol="0" anchor="ctr"/>
-            <a:lstStyle/>
-            <a:p>
-              <a:pPr algn="ctr"/>
-              <a:endParaRPr lang="en-GB"/>
-            </a:p>
-          </p:txBody>
-        </p:sp>
-        <p:sp>
-          <p:nvSpPr>
-            <p:cNvPr id="21" name="Arrow: Right 20">
-              <a:extLst>
-                <a:ext uri="{FF2B5EF4-FFF2-40B4-BE49-F238E27FC236}">
-                  <a16:creationId xmlns:a16="http://schemas.microsoft.com/office/drawing/2014/main" id="{93C1BF73-E305-A939-703E-9D336BA021B1}"/>
-                </a:ext>
-              </a:extLst>
-            </p:cNvPr>
-            <p:cNvSpPr/>
-            <p:nvPr/>
-          </p:nvSpPr>
-          <p:spPr>
-            <a:xfrm>
-              <a:off x="7228645" y="2498013"/>
-              <a:ext cx="676923" cy="335298"/>
-            </a:xfrm>
-            <a:prstGeom prst="rightArrow">
-              <a:avLst/>
-            </a:prstGeom>
-            <a:noFill/>
-          </p:spPr>
-          <p:style>
-            <a:lnRef idx="2">
-              <a:schemeClr val="accent1">
-                <a:shade val="50000"/>
-              </a:schemeClr>
-            </a:lnRef>
-            <a:fillRef idx="1">
-              <a:schemeClr val="accent1"/>
-            </a:fillRef>
-            <a:effectRef idx="0">
-              <a:schemeClr val="accent1"/>
-            </a:effectRef>
-            <a:fontRef idx="minor">
-              <a:schemeClr val="lt1"/>
-            </a:fontRef>
-          </p:style>
-          <p:txBody>
-            <a:bodyPr rtlCol="0" anchor="ctr"/>
-            <a:lstStyle/>
-            <a:p>
-              <a:pPr algn="ctr"/>
-              <a:endParaRPr lang="en-GB"/>
+              <a:endParaRPr lang="en-GB">
+                <a:solidFill>
+                  <a:schemeClr val="tx1"/>
+                </a:solidFill>
+              </a:endParaRPr>
             </a:p>
           </p:txBody>
         </p:sp>
       </p:grpSp>
+      <p:sp>
+        <p:nvSpPr>
+          <p:cNvPr id="4" name="TextBox 3">
+            <a:extLst>
+              <a:ext uri="{FF2B5EF4-FFF2-40B4-BE49-F238E27FC236}">
+                <a16:creationId xmlns:a16="http://schemas.microsoft.com/office/drawing/2014/main" id="{6F991285-8685-FA41-54AD-F9723C66B34B}"/>
+              </a:ext>
+            </a:extLst>
+          </p:cNvPr>
+          <p:cNvSpPr txBox="1"/>
+          <p:nvPr/>
+        </p:nvSpPr>
+        <p:spPr>
+          <a:xfrm>
+            <a:off x="3461085" y="698429"/>
+            <a:ext cx="627453" cy="369332"/>
+          </a:xfrm>
+          <a:prstGeom prst="rect">
+            <a:avLst/>
+          </a:prstGeom>
+          <a:noFill/>
+        </p:spPr>
+        <p:txBody>
+          <a:bodyPr wrap="square" rtlCol="0" anchor="ctr">
+            <a:spAutoFit/>
+          </a:bodyPr>
+          <a:lstStyle/>
+          <a:p>
+            <a:pPr algn="ctr"/>
+            <a:r>
+              <a:rPr lang="en-GB" dirty="0"/>
+              <a:t>. . .</a:t>
+            </a:r>
+          </a:p>
+        </p:txBody>
+      </p:sp>
+      <p:sp>
+        <p:nvSpPr>
+          <p:cNvPr id="17" name="TextBox 16">
+            <a:extLst>
+              <a:ext uri="{FF2B5EF4-FFF2-40B4-BE49-F238E27FC236}">
+                <a16:creationId xmlns:a16="http://schemas.microsoft.com/office/drawing/2014/main" id="{CE6E7A46-079A-4A70-DFFA-3E4170184F0E}"/>
+              </a:ext>
+            </a:extLst>
+          </p:cNvPr>
+          <p:cNvSpPr txBox="1"/>
+          <p:nvPr/>
+        </p:nvSpPr>
+        <p:spPr>
+          <a:xfrm>
+            <a:off x="6357660" y="698429"/>
+            <a:ext cx="627453" cy="369332"/>
+          </a:xfrm>
+          <a:prstGeom prst="rect">
+            <a:avLst/>
+          </a:prstGeom>
+          <a:noFill/>
+        </p:spPr>
+        <p:txBody>
+          <a:bodyPr wrap="square" rtlCol="0" anchor="ctr">
+            <a:spAutoFit/>
+          </a:bodyPr>
+          <a:lstStyle/>
+          <a:p>
+            <a:pPr algn="ctr"/>
+            <a:r>
+              <a:rPr lang="en-GB" dirty="0"/>
+              <a:t>. . .</a:t>
+            </a:r>
+          </a:p>
+        </p:txBody>
+      </p:sp>
     </p:spTree>
     <p:extLst>
       <p:ext uri="{BB962C8B-B14F-4D97-AF65-F5344CB8AC3E}">
@@ -3997,7 +3605,7 @@
 <file path=ppt/theme/theme1.xml><?xml version="1.0" encoding="utf-8"?>
 <a:theme xmlns:a="http://schemas.openxmlformats.org/drawingml/2006/main" name="Office Theme">
   <a:themeElements>
-    <a:clrScheme name="Office">
+    <a:clrScheme name="Office Theme">
       <a:dk1>
         <a:sysClr val="windowText" lastClr="000000"/>
       </a:dk1>
@@ -4035,7 +3643,7 @@
         <a:srgbClr val="954F72"/>
       </a:folHlink>
     </a:clrScheme>
-    <a:fontScheme name="Office">
+    <a:fontScheme name="Office Theme">
       <a:majorFont>
         <a:latin typeface="Calibri Light" panose="020F0302020204030204"/>
         <a:ea typeface=""/>
@@ -4070,23 +3678,6 @@
         <a:font script="Viet" typeface="Times New Roman"/>
         <a:font script="Uigh" typeface="Microsoft Uighur"/>
         <a:font script="Geor" typeface="Sylfaen"/>
-        <a:font script="Armn" typeface="Arial"/>
-        <a:font script="Bugi" typeface="Leelawadee UI"/>
-        <a:font script="Bopo" typeface="Microsoft JhengHei"/>
-        <a:font script="Java" typeface="Javanese Text"/>
-        <a:font script="Lisu" typeface="Segoe UI"/>
-        <a:font script="Mymr" typeface="Myanmar Text"/>
-        <a:font script="Nkoo" typeface="Ebrima"/>
-        <a:font script="Olck" typeface="Nirmala UI"/>
-        <a:font script="Osma" typeface="Ebrima"/>
-        <a:font script="Phag" typeface="Phagspa"/>
-        <a:font script="Syrn" typeface="Estrangelo Edessa"/>
-        <a:font script="Syrj" typeface="Estrangelo Edessa"/>
-        <a:font script="Syre" typeface="Estrangelo Edessa"/>
-        <a:font script="Sora" typeface="Nirmala UI"/>
-        <a:font script="Tale" typeface="Microsoft Tai Le"/>
-        <a:font script="Talu" typeface="Microsoft New Tai Lue"/>
-        <a:font script="Tfng" typeface="Ebrima"/>
       </a:majorFont>
       <a:minorFont>
         <a:latin typeface="Calibri" panose="020F0502020204030204"/>
@@ -4122,26 +3713,9 @@
         <a:font script="Viet" typeface="Arial"/>
         <a:font script="Uigh" typeface="Microsoft Uighur"/>
         <a:font script="Geor" typeface="Sylfaen"/>
-        <a:font script="Armn" typeface="Arial"/>
-        <a:font script="Bugi" typeface="Leelawadee UI"/>
-        <a:font script="Bopo" typeface="Microsoft JhengHei"/>
-        <a:font script="Java" typeface="Javanese Text"/>
-        <a:font script="Lisu" typeface="Segoe UI"/>
-        <a:font script="Mymr" typeface="Myanmar Text"/>
-        <a:font script="Nkoo" typeface="Ebrima"/>
-        <a:font script="Olck" typeface="Nirmala UI"/>
-        <a:font script="Osma" typeface="Ebrima"/>
-        <a:font script="Phag" typeface="Phagspa"/>
-        <a:font script="Syrn" typeface="Estrangelo Edessa"/>
-        <a:font script="Syrj" typeface="Estrangelo Edessa"/>
-        <a:font script="Syre" typeface="Estrangelo Edessa"/>
-        <a:font script="Sora" typeface="Nirmala UI"/>
-        <a:font script="Tale" typeface="Microsoft Tai Le"/>
-        <a:font script="Talu" typeface="Microsoft New Tai Lue"/>
-        <a:font script="Tfng" typeface="Ebrima"/>
       </a:minorFont>
     </a:fontScheme>
-    <a:fmtScheme name="Office">
+    <a:fmtScheme name="Office Theme">
       <a:fillStyleLst>
         <a:solidFill>
           <a:schemeClr val="phClr"/>

</xml_diff>